<commit_message>
Update Dissipative dynamics of spins in Rydberg molecular gas.pptx
</commit_message>
<xml_diff>
--- a/Dissipative dynamics of spins in Rydberg molecular gas.pptx
+++ b/Dissipative dynamics of spins in Rydberg molecular gas.pptx
@@ -7,13 +7,17 @@
   <p:sldIdLst>
     <p:sldId id="256" r:id="rId2"/>
     <p:sldId id="257" r:id="rId3"/>
-    <p:sldId id="258" r:id="rId4"/>
-    <p:sldId id="259" r:id="rId5"/>
-    <p:sldId id="260" r:id="rId6"/>
-    <p:sldId id="261" r:id="rId7"/>
-    <p:sldId id="262" r:id="rId8"/>
-    <p:sldId id="263" r:id="rId9"/>
-    <p:sldId id="264" r:id="rId10"/>
+    <p:sldId id="259" r:id="rId4"/>
+    <p:sldId id="258" r:id="rId5"/>
+    <p:sldId id="262" r:id="rId6"/>
+    <p:sldId id="264" r:id="rId7"/>
+    <p:sldId id="265" r:id="rId8"/>
+    <p:sldId id="266" r:id="rId9"/>
+    <p:sldId id="267" r:id="rId10"/>
+    <p:sldId id="268" r:id="rId11"/>
+    <p:sldId id="269" r:id="rId12"/>
+    <p:sldId id="260" r:id="rId13"/>
+    <p:sldId id="261" r:id="rId14"/>
   </p:sldIdLst>
   <p:sldSz cx="12192000" cy="6858000"/>
   <p:notesSz cx="6858000" cy="9144000"/>
@@ -277,7 +281,7 @@
           <a:p>
             <a:fld id="{0CA67C19-5399-4425-B5D8-4E0932CDFEAB}" type="datetimeFigureOut">
               <a:rPr lang="en-CA" smtClean="0"/>
-              <a:t>2021-11-01</a:t>
+              <a:t>2021-11-02</a:t>
             </a:fld>
             <a:endParaRPr lang="en-CA"/>
           </a:p>
@@ -477,7 +481,7 @@
           <a:p>
             <a:fld id="{0CA67C19-5399-4425-B5D8-4E0932CDFEAB}" type="datetimeFigureOut">
               <a:rPr lang="en-CA" smtClean="0"/>
-              <a:t>2021-11-01</a:t>
+              <a:t>2021-11-02</a:t>
             </a:fld>
             <a:endParaRPr lang="en-CA"/>
           </a:p>
@@ -687,7 +691,7 @@
           <a:p>
             <a:fld id="{0CA67C19-5399-4425-B5D8-4E0932CDFEAB}" type="datetimeFigureOut">
               <a:rPr lang="en-CA" smtClean="0"/>
-              <a:t>2021-11-01</a:t>
+              <a:t>2021-11-02</a:t>
             </a:fld>
             <a:endParaRPr lang="en-CA"/>
           </a:p>
@@ -887,7 +891,7 @@
           <a:p>
             <a:fld id="{0CA67C19-5399-4425-B5D8-4E0932CDFEAB}" type="datetimeFigureOut">
               <a:rPr lang="en-CA" smtClean="0"/>
-              <a:t>2021-11-01</a:t>
+              <a:t>2021-11-02</a:t>
             </a:fld>
             <a:endParaRPr lang="en-CA"/>
           </a:p>
@@ -1163,7 +1167,7 @@
           <a:p>
             <a:fld id="{0CA67C19-5399-4425-B5D8-4E0932CDFEAB}" type="datetimeFigureOut">
               <a:rPr lang="en-CA" smtClean="0"/>
-              <a:t>2021-11-01</a:t>
+              <a:t>2021-11-02</a:t>
             </a:fld>
             <a:endParaRPr lang="en-CA"/>
           </a:p>
@@ -1431,7 +1435,7 @@
           <a:p>
             <a:fld id="{0CA67C19-5399-4425-B5D8-4E0932CDFEAB}" type="datetimeFigureOut">
               <a:rPr lang="en-CA" smtClean="0"/>
-              <a:t>2021-11-01</a:t>
+              <a:t>2021-11-02</a:t>
             </a:fld>
             <a:endParaRPr lang="en-CA"/>
           </a:p>
@@ -1846,7 +1850,7 @@
           <a:p>
             <a:fld id="{0CA67C19-5399-4425-B5D8-4E0932CDFEAB}" type="datetimeFigureOut">
               <a:rPr lang="en-CA" smtClean="0"/>
-              <a:t>2021-11-01</a:t>
+              <a:t>2021-11-02</a:t>
             </a:fld>
             <a:endParaRPr lang="en-CA"/>
           </a:p>
@@ -1988,7 +1992,7 @@
           <a:p>
             <a:fld id="{0CA67C19-5399-4425-B5D8-4E0932CDFEAB}" type="datetimeFigureOut">
               <a:rPr lang="en-CA" smtClean="0"/>
-              <a:t>2021-11-01</a:t>
+              <a:t>2021-11-02</a:t>
             </a:fld>
             <a:endParaRPr lang="en-CA"/>
           </a:p>
@@ -2101,7 +2105,7 @@
           <a:p>
             <a:fld id="{0CA67C19-5399-4425-B5D8-4E0932CDFEAB}" type="datetimeFigureOut">
               <a:rPr lang="en-CA" smtClean="0"/>
-              <a:t>2021-11-01</a:t>
+              <a:t>2021-11-02</a:t>
             </a:fld>
             <a:endParaRPr lang="en-CA"/>
           </a:p>
@@ -2414,7 +2418,7 @@
           <a:p>
             <a:fld id="{0CA67C19-5399-4425-B5D8-4E0932CDFEAB}" type="datetimeFigureOut">
               <a:rPr lang="en-CA" smtClean="0"/>
-              <a:t>2021-11-01</a:t>
+              <a:t>2021-11-02</a:t>
             </a:fld>
             <a:endParaRPr lang="en-CA"/>
           </a:p>
@@ -2703,7 +2707,7 @@
           <a:p>
             <a:fld id="{0CA67C19-5399-4425-B5D8-4E0932CDFEAB}" type="datetimeFigureOut">
               <a:rPr lang="en-CA" smtClean="0"/>
-              <a:t>2021-11-01</a:t>
+              <a:t>2021-11-02</a:t>
             </a:fld>
             <a:endParaRPr lang="en-CA"/>
           </a:p>
@@ -2946,7 +2950,7 @@
           <a:p>
             <a:fld id="{0CA67C19-5399-4425-B5D8-4E0932CDFEAB}" type="datetimeFigureOut">
               <a:rPr lang="en-CA" smtClean="0"/>
-              <a:t>2021-11-01</a:t>
+              <a:t>2021-11-02</a:t>
             </a:fld>
             <a:endParaRPr lang="en-CA"/>
           </a:p>
@@ -3461,6 +3465,904 @@
 </p:sld>
 </file>
 
+<file path=ppt/slides/slide10.xml><?xml version="1.0" encoding="utf-8"?>
+<p:sld xmlns:a="http://schemas.openxmlformats.org/drawingml/2006/main" xmlns:r="http://schemas.openxmlformats.org/officeDocument/2006/relationships" xmlns:p="http://schemas.openxmlformats.org/presentationml/2006/main">
+  <p:cSld>
+    <p:spTree>
+      <p:nvGrpSpPr>
+        <p:cNvPr id="1" name=""/>
+        <p:cNvGrpSpPr/>
+        <p:nvPr/>
+      </p:nvGrpSpPr>
+      <p:grpSpPr>
+        <a:xfrm>
+          <a:off x="0" y="0"/>
+          <a:ext cx="0" cy="0"/>
+          <a:chOff x="0" y="0"/>
+          <a:chExt cx="0" cy="0"/>
+        </a:xfrm>
+      </p:grpSpPr>
+      <p:sp>
+        <p:nvSpPr>
+          <p:cNvPr id="2" name="Title 1"/>
+          <p:cNvSpPr>
+            <a:spLocks noGrp="1"/>
+          </p:cNvSpPr>
+          <p:nvPr>
+            <p:ph type="title"/>
+          </p:nvPr>
+        </p:nvSpPr>
+        <p:spPr>
+          <a:xfrm>
+            <a:off x="838200" y="365125"/>
+            <a:ext cx="10515600" cy="482163"/>
+          </a:xfrm>
+        </p:spPr>
+        <p:txBody>
+          <a:bodyPr>
+            <a:normAutofit fontScale="90000"/>
+          </a:bodyPr>
+          <a:lstStyle/>
+          <a:p>
+            <a:r>
+              <a:rPr lang="en-CA" dirty="0" smtClean="0"/>
+              <a:t>Semi-classical approximation </a:t>
+            </a:r>
+            <a:endParaRPr lang="en-CA" dirty="0"/>
+          </a:p>
+        </p:txBody>
+      </p:sp>
+      <p:sp>
+        <p:nvSpPr>
+          <p:cNvPr id="3" name="Content Placeholder 2"/>
+          <p:cNvSpPr>
+            <a:spLocks noGrp="1"/>
+          </p:cNvSpPr>
+          <p:nvPr>
+            <p:ph idx="1"/>
+          </p:nvPr>
+        </p:nvSpPr>
+        <p:spPr>
+          <a:xfrm>
+            <a:off x="838200" y="1157681"/>
+            <a:ext cx="10515600" cy="5019282"/>
+          </a:xfrm>
+        </p:spPr>
+        <p:txBody>
+          <a:bodyPr>
+            <a:normAutofit/>
+          </a:bodyPr>
+          <a:lstStyle/>
+          <a:p>
+            <a:endParaRPr lang="en-CA" sz="2400" dirty="0" smtClean="0"/>
+          </a:p>
+          <a:p>
+            <a:endParaRPr lang="en-CA" sz="2400" dirty="0"/>
+          </a:p>
+          <a:p>
+            <a:endParaRPr lang="en-CA" sz="2400" dirty="0" smtClean="0"/>
+          </a:p>
+          <a:p>
+            <a:endParaRPr lang="en-CA" sz="2400" dirty="0"/>
+          </a:p>
+          <a:p>
+            <a:endParaRPr lang="en-CA" sz="2400" dirty="0" smtClean="0"/>
+          </a:p>
+          <a:p>
+            <a:endParaRPr lang="en-CA" sz="2400" dirty="0"/>
+          </a:p>
+          <a:p>
+            <a:endParaRPr lang="en-CA" sz="2400" dirty="0" smtClean="0"/>
+          </a:p>
+          <a:p>
+            <a:endParaRPr lang="en-CA" sz="2400" dirty="0"/>
+          </a:p>
+          <a:p>
+            <a:r>
+              <a:rPr lang="en-CA" sz="2400" dirty="0" smtClean="0"/>
+              <a:t>1</a:t>
+            </a:r>
+            <a:r>
+              <a:rPr lang="en-CA" sz="2400" baseline="30000" dirty="0" smtClean="0"/>
+              <a:t>st</a:t>
+            </a:r>
+            <a:r>
+              <a:rPr lang="en-CA" sz="2400" dirty="0" smtClean="0"/>
+              <a:t> order : </a:t>
+            </a:r>
+            <a:endParaRPr lang="en-CA" sz="2400" dirty="0"/>
+          </a:p>
+        </p:txBody>
+      </p:sp>
+      <p:pic>
+        <p:nvPicPr>
+          <p:cNvPr id="6" name="Picture 5"/>
+          <p:cNvPicPr>
+            <a:picLocks noChangeAspect="1"/>
+          </p:cNvPicPr>
+          <p:nvPr/>
+        </p:nvPicPr>
+        <p:blipFill>
+          <a:blip r:embed="rId2"/>
+          <a:stretch>
+            <a:fillRect/>
+          </a:stretch>
+        </p:blipFill>
+        <p:spPr>
+          <a:xfrm>
+            <a:off x="2405238" y="4773337"/>
+            <a:ext cx="2314575" cy="390525"/>
+          </a:xfrm>
+          <a:prstGeom prst="rect">
+            <a:avLst/>
+          </a:prstGeom>
+        </p:spPr>
+      </p:pic>
+      <p:pic>
+        <p:nvPicPr>
+          <p:cNvPr id="7" name="Picture 6"/>
+          <p:cNvPicPr>
+            <a:picLocks noChangeAspect="1"/>
+          </p:cNvPicPr>
+          <p:nvPr/>
+        </p:nvPicPr>
+        <p:blipFill>
+          <a:blip r:embed="rId3"/>
+          <a:stretch>
+            <a:fillRect/>
+          </a:stretch>
+        </p:blipFill>
+        <p:spPr>
+          <a:xfrm>
+            <a:off x="629216" y="2832230"/>
+            <a:ext cx="6353175" cy="1581150"/>
+          </a:xfrm>
+          <a:prstGeom prst="rect">
+            <a:avLst/>
+          </a:prstGeom>
+        </p:spPr>
+      </p:pic>
+      <p:pic>
+        <p:nvPicPr>
+          <p:cNvPr id="8" name="Picture 7">
+            <a:extLst>
+              <a:ext uri="{FF2B5EF4-FFF2-40B4-BE49-F238E27FC236}">
+                <a16:creationId xmlns:a16="http://schemas.microsoft.com/office/drawing/2014/main" id="{92284C03-5A4C-47E3-B43F-4F192F845875}"/>
+              </a:ext>
+            </a:extLst>
+          </p:cNvPr>
+          <p:cNvPicPr>
+            <a:picLocks noChangeAspect="1"/>
+          </p:cNvPicPr>
+          <p:nvPr/>
+        </p:nvPicPr>
+        <p:blipFill>
+          <a:blip r:embed="rId4"/>
+          <a:stretch>
+            <a:fillRect/>
+          </a:stretch>
+        </p:blipFill>
+        <p:spPr>
+          <a:xfrm>
+            <a:off x="1517970" y="1426789"/>
+            <a:ext cx="6876125" cy="1223009"/>
+          </a:xfrm>
+          <a:prstGeom prst="rect">
+            <a:avLst/>
+          </a:prstGeom>
+        </p:spPr>
+      </p:pic>
+    </p:spTree>
+    <p:extLst>
+      <p:ext uri="{BB962C8B-B14F-4D97-AF65-F5344CB8AC3E}">
+        <p14:creationId xmlns:p14="http://schemas.microsoft.com/office/powerpoint/2010/main" val="4069649599"/>
+      </p:ext>
+    </p:extLst>
+  </p:cSld>
+  <p:clrMapOvr>
+    <a:masterClrMapping/>
+  </p:clrMapOvr>
+</p:sld>
+</file>
+
+<file path=ppt/slides/slide11.xml><?xml version="1.0" encoding="utf-8"?>
+<p:sld xmlns:a="http://schemas.openxmlformats.org/drawingml/2006/main" xmlns:r="http://schemas.openxmlformats.org/officeDocument/2006/relationships" xmlns:p="http://schemas.openxmlformats.org/presentationml/2006/main">
+  <p:cSld>
+    <p:spTree>
+      <p:nvGrpSpPr>
+        <p:cNvPr id="1" name=""/>
+        <p:cNvGrpSpPr/>
+        <p:nvPr/>
+      </p:nvGrpSpPr>
+      <p:grpSpPr>
+        <a:xfrm>
+          <a:off x="0" y="0"/>
+          <a:ext cx="0" cy="0"/>
+          <a:chOff x="0" y="0"/>
+          <a:chExt cx="0" cy="0"/>
+        </a:xfrm>
+      </p:grpSpPr>
+      <p:sp>
+        <p:nvSpPr>
+          <p:cNvPr id="2" name="Title 1"/>
+          <p:cNvSpPr>
+            <a:spLocks noGrp="1"/>
+          </p:cNvSpPr>
+          <p:nvPr>
+            <p:ph type="title"/>
+          </p:nvPr>
+        </p:nvSpPr>
+        <p:spPr>
+          <a:xfrm>
+            <a:off x="838200" y="365126"/>
+            <a:ext cx="10515600" cy="691888"/>
+          </a:xfrm>
+        </p:spPr>
+        <p:txBody>
+          <a:bodyPr>
+            <a:normAutofit fontScale="90000"/>
+          </a:bodyPr>
+          <a:lstStyle/>
+          <a:p>
+            <a:endParaRPr lang="en-CA" dirty="0"/>
+          </a:p>
+        </p:txBody>
+      </p:sp>
+      <p:sp>
+        <p:nvSpPr>
+          <p:cNvPr id="3" name="Content Placeholder 2"/>
+          <p:cNvSpPr>
+            <a:spLocks noGrp="1"/>
+          </p:cNvSpPr>
+          <p:nvPr>
+            <p:ph idx="1"/>
+          </p:nvPr>
+        </p:nvSpPr>
+        <p:spPr>
+          <a:xfrm>
+            <a:off x="838200" y="1132514"/>
+            <a:ext cx="10515600" cy="5044450"/>
+          </a:xfrm>
+        </p:spPr>
+        <p:txBody>
+          <a:bodyPr>
+            <a:normAutofit/>
+          </a:bodyPr>
+          <a:lstStyle/>
+          <a:p>
+            <a:r>
+              <a:rPr lang="en-CA" sz="1800" dirty="0" smtClean="0"/>
+              <a:t>Sensitive to initial density</a:t>
+            </a:r>
+          </a:p>
+          <a:p>
+            <a:r>
+              <a:rPr lang="en-CA" sz="1800" dirty="0" smtClean="0"/>
+              <a:t>   (0.075, 0.997)                                                                               (0.966, 0.289)</a:t>
+            </a:r>
+            <a:endParaRPr lang="en-CA" sz="1800" dirty="0"/>
+          </a:p>
+        </p:txBody>
+      </p:sp>
+      <p:pic>
+        <p:nvPicPr>
+          <p:cNvPr id="6" name="Picture 5"/>
+          <p:cNvPicPr>
+            <a:picLocks noChangeAspect="1"/>
+          </p:cNvPicPr>
+          <p:nvPr/>
+        </p:nvPicPr>
+        <p:blipFill>
+          <a:blip r:embed="rId2"/>
+          <a:stretch>
+            <a:fillRect/>
+          </a:stretch>
+        </p:blipFill>
+        <p:spPr>
+          <a:xfrm>
+            <a:off x="5752193" y="2059553"/>
+            <a:ext cx="5066666" cy="3695238"/>
+          </a:xfrm>
+          <a:prstGeom prst="rect">
+            <a:avLst/>
+          </a:prstGeom>
+        </p:spPr>
+      </p:pic>
+      <p:pic>
+        <p:nvPicPr>
+          <p:cNvPr id="7" name="Picture 6"/>
+          <p:cNvPicPr>
+            <a:picLocks noChangeAspect="1"/>
+          </p:cNvPicPr>
+          <p:nvPr/>
+        </p:nvPicPr>
+        <p:blipFill>
+          <a:blip r:embed="rId3"/>
+          <a:stretch>
+            <a:fillRect/>
+          </a:stretch>
+        </p:blipFill>
+        <p:spPr>
+          <a:xfrm>
+            <a:off x="679324" y="2059553"/>
+            <a:ext cx="5231746" cy="3695238"/>
+          </a:xfrm>
+          <a:prstGeom prst="rect">
+            <a:avLst/>
+          </a:prstGeom>
+        </p:spPr>
+      </p:pic>
+    </p:spTree>
+    <p:extLst>
+      <p:ext uri="{BB962C8B-B14F-4D97-AF65-F5344CB8AC3E}">
+        <p14:creationId xmlns:p14="http://schemas.microsoft.com/office/powerpoint/2010/main" val="1007457190"/>
+      </p:ext>
+    </p:extLst>
+  </p:cSld>
+  <p:clrMapOvr>
+    <a:masterClrMapping/>
+  </p:clrMapOvr>
+</p:sld>
+</file>
+
+<file path=ppt/slides/slide12.xml><?xml version="1.0" encoding="utf-8"?>
+<p:sld xmlns:a="http://schemas.openxmlformats.org/drawingml/2006/main" xmlns:r="http://schemas.openxmlformats.org/officeDocument/2006/relationships" xmlns:p="http://schemas.openxmlformats.org/presentationml/2006/main">
+  <p:cSld>
+    <p:spTree>
+      <p:nvGrpSpPr>
+        <p:cNvPr id="1" name=""/>
+        <p:cNvGrpSpPr/>
+        <p:nvPr/>
+      </p:nvGrpSpPr>
+      <p:grpSpPr>
+        <a:xfrm>
+          <a:off x="0" y="0"/>
+          <a:ext cx="0" cy="0"/>
+          <a:chOff x="0" y="0"/>
+          <a:chExt cx="0" cy="0"/>
+        </a:xfrm>
+      </p:grpSpPr>
+      <p:pic>
+        <p:nvPicPr>
+          <p:cNvPr id="12" name="Content Placeholder 3">
+            <a:extLst>
+              <a:ext uri="{FF2B5EF4-FFF2-40B4-BE49-F238E27FC236}">
+                <a16:creationId xmlns:a16="http://schemas.microsoft.com/office/drawing/2014/main" id="{B4B289DF-26CB-49C4-93FA-410B41D42098}"/>
+              </a:ext>
+            </a:extLst>
+          </p:cNvPr>
+          <p:cNvPicPr>
+            <a:picLocks noChangeAspect="1"/>
+          </p:cNvPicPr>
+          <p:nvPr/>
+        </p:nvPicPr>
+        <p:blipFill>
+          <a:blip r:embed="rId2"/>
+          <a:stretch>
+            <a:fillRect/>
+          </a:stretch>
+        </p:blipFill>
+        <p:spPr>
+          <a:xfrm>
+            <a:off x="508000" y="908050"/>
+            <a:ext cx="3975100" cy="2677140"/>
+          </a:xfrm>
+          <a:prstGeom prst="rect">
+            <a:avLst/>
+          </a:prstGeom>
+        </p:spPr>
+      </p:pic>
+      <p:sp>
+        <p:nvSpPr>
+          <p:cNvPr id="3" name="Content Placeholder 2">
+            <a:extLst>
+              <a:ext uri="{FF2B5EF4-FFF2-40B4-BE49-F238E27FC236}">
+                <a16:creationId xmlns:a16="http://schemas.microsoft.com/office/drawing/2014/main" id="{6420A58B-D009-4A53-929D-AB30E8B37EA2}"/>
+              </a:ext>
+            </a:extLst>
+          </p:cNvPr>
+          <p:cNvSpPr>
+            <a:spLocks noGrp="1"/>
+          </p:cNvSpPr>
+          <p:nvPr>
+            <p:ph idx="1"/>
+          </p:nvPr>
+        </p:nvSpPr>
+        <p:spPr/>
+        <p:txBody>
+          <a:bodyPr/>
+          <a:lstStyle/>
+          <a:p>
+            <a:endParaRPr lang="en-CA" dirty="0"/>
+          </a:p>
+        </p:txBody>
+      </p:sp>
+      <p:pic>
+        <p:nvPicPr>
+          <p:cNvPr id="4" name="Picture 3">
+            <a:extLst>
+              <a:ext uri="{FF2B5EF4-FFF2-40B4-BE49-F238E27FC236}">
+                <a16:creationId xmlns:a16="http://schemas.microsoft.com/office/drawing/2014/main" id="{6176BA02-31BE-43D8-9736-CBF535B6AC8C}"/>
+              </a:ext>
+            </a:extLst>
+          </p:cNvPr>
+          <p:cNvPicPr>
+            <a:picLocks noChangeAspect="1"/>
+          </p:cNvPicPr>
+          <p:nvPr/>
+        </p:nvPicPr>
+        <p:blipFill>
+          <a:blip r:embed="rId3">
+            <a:lum/>
+            <a:alphaModFix/>
+          </a:blip>
+          <a:srcRect/>
+          <a:stretch>
+            <a:fillRect/>
+          </a:stretch>
+        </p:blipFill>
+        <p:spPr>
+          <a:xfrm>
+            <a:off x="930654" y="3650542"/>
+            <a:ext cx="3282950" cy="2461069"/>
+          </a:xfrm>
+          <a:prstGeom prst="rect">
+            <a:avLst/>
+          </a:prstGeom>
+          <a:noFill/>
+          <a:ln>
+            <a:noFill/>
+          </a:ln>
+        </p:spPr>
+      </p:pic>
+      <p:pic>
+        <p:nvPicPr>
+          <p:cNvPr id="5" name="Picture 4">
+            <a:extLst>
+              <a:ext uri="{FF2B5EF4-FFF2-40B4-BE49-F238E27FC236}">
+                <a16:creationId xmlns:a16="http://schemas.microsoft.com/office/drawing/2014/main" id="{172EA10B-95C8-4DE8-AA64-60BF133137AD}"/>
+              </a:ext>
+            </a:extLst>
+          </p:cNvPr>
+          <p:cNvPicPr>
+            <a:picLocks noChangeAspect="1"/>
+          </p:cNvPicPr>
+          <p:nvPr/>
+        </p:nvPicPr>
+        <p:blipFill>
+          <a:blip r:embed="rId4">
+            <a:lum/>
+            <a:alphaModFix/>
+          </a:blip>
+          <a:srcRect/>
+          <a:stretch>
+            <a:fillRect/>
+          </a:stretch>
+        </p:blipFill>
+        <p:spPr>
+          <a:xfrm>
+            <a:off x="808953" y="967931"/>
+            <a:ext cx="3312197" cy="2484463"/>
+          </a:xfrm>
+          <a:prstGeom prst="rect">
+            <a:avLst/>
+          </a:prstGeom>
+          <a:noFill/>
+          <a:ln>
+            <a:noFill/>
+          </a:ln>
+        </p:spPr>
+      </p:pic>
+      <p:sp>
+        <p:nvSpPr>
+          <p:cNvPr id="7" name="Title 1">
+            <a:extLst>
+              <a:ext uri="{FF2B5EF4-FFF2-40B4-BE49-F238E27FC236}">
+                <a16:creationId xmlns:a16="http://schemas.microsoft.com/office/drawing/2014/main" id="{99227E0B-1E7A-490D-B1DF-D3B71D2BF331}"/>
+              </a:ext>
+            </a:extLst>
+          </p:cNvPr>
+          <p:cNvSpPr>
+            <a:spLocks noGrp="1"/>
+          </p:cNvSpPr>
+          <p:nvPr>
+            <p:ph type="title"/>
+          </p:nvPr>
+        </p:nvSpPr>
+        <p:spPr>
+          <a:xfrm>
+            <a:off x="838200" y="365125"/>
+            <a:ext cx="10515600" cy="212725"/>
+          </a:xfrm>
+        </p:spPr>
+        <p:txBody>
+          <a:bodyPr>
+            <a:normAutofit fontScale="90000"/>
+          </a:bodyPr>
+          <a:lstStyle/>
+          <a:p>
+            <a:r>
+              <a:rPr lang="en-CA" dirty="0"/>
+              <a:t>fine structure distribution in mm-wave</a:t>
+            </a:r>
+          </a:p>
+        </p:txBody>
+      </p:sp>
+      <p:pic>
+        <p:nvPicPr>
+          <p:cNvPr id="8" name="Picture 7">
+            <a:extLst>
+              <a:ext uri="{FF2B5EF4-FFF2-40B4-BE49-F238E27FC236}">
+                <a16:creationId xmlns:a16="http://schemas.microsoft.com/office/drawing/2014/main" id="{8BEDD287-16F2-453E-B4AD-717CAAB1C7B6}"/>
+              </a:ext>
+            </a:extLst>
+          </p:cNvPr>
+          <p:cNvPicPr>
+            <a:picLocks noChangeAspect="1"/>
+          </p:cNvPicPr>
+          <p:nvPr/>
+        </p:nvPicPr>
+        <p:blipFill>
+          <a:blip r:embed="rId5">
+            <a:lum/>
+            <a:alphaModFix/>
+          </a:blip>
+          <a:srcRect/>
+          <a:stretch>
+            <a:fillRect/>
+          </a:stretch>
+        </p:blipFill>
+        <p:spPr>
+          <a:xfrm>
+            <a:off x="4219889" y="967931"/>
+            <a:ext cx="3312619" cy="2484464"/>
+          </a:xfrm>
+          <a:prstGeom prst="rect">
+            <a:avLst/>
+          </a:prstGeom>
+          <a:noFill/>
+          <a:ln>
+            <a:noFill/>
+          </a:ln>
+        </p:spPr>
+      </p:pic>
+      <p:pic>
+        <p:nvPicPr>
+          <p:cNvPr id="9" name="Picture 8">
+            <a:extLst>
+              <a:ext uri="{FF2B5EF4-FFF2-40B4-BE49-F238E27FC236}">
+                <a16:creationId xmlns:a16="http://schemas.microsoft.com/office/drawing/2014/main" id="{5574D827-11F2-4832-93FC-B59B7AEC8F97}"/>
+              </a:ext>
+            </a:extLst>
+          </p:cNvPr>
+          <p:cNvPicPr>
+            <a:picLocks noChangeAspect="1"/>
+          </p:cNvPicPr>
+          <p:nvPr/>
+        </p:nvPicPr>
+        <p:blipFill>
+          <a:blip r:embed="rId6">
+            <a:lum/>
+            <a:alphaModFix/>
+          </a:blip>
+          <a:srcRect/>
+          <a:stretch>
+            <a:fillRect/>
+          </a:stretch>
+        </p:blipFill>
+        <p:spPr>
+          <a:xfrm>
+            <a:off x="4228227" y="3524316"/>
+            <a:ext cx="3538580" cy="2652647"/>
+          </a:xfrm>
+          <a:prstGeom prst="rect">
+            <a:avLst/>
+          </a:prstGeom>
+          <a:noFill/>
+          <a:ln>
+            <a:noFill/>
+          </a:ln>
+        </p:spPr>
+      </p:pic>
+      <p:pic>
+        <p:nvPicPr>
+          <p:cNvPr id="10" name="Picture 9">
+            <a:extLst>
+              <a:ext uri="{FF2B5EF4-FFF2-40B4-BE49-F238E27FC236}">
+                <a16:creationId xmlns:a16="http://schemas.microsoft.com/office/drawing/2014/main" id="{54002C32-69F0-4BD8-BE73-9D76CC6CE08F}"/>
+              </a:ext>
+            </a:extLst>
+          </p:cNvPr>
+          <p:cNvPicPr>
+            <a:picLocks noChangeAspect="1"/>
+          </p:cNvPicPr>
+          <p:nvPr/>
+        </p:nvPicPr>
+        <p:blipFill>
+          <a:blip r:embed="rId7">
+            <a:lum/>
+            <a:alphaModFix/>
+          </a:blip>
+          <a:srcRect/>
+          <a:stretch>
+            <a:fillRect/>
+          </a:stretch>
+        </p:blipFill>
+        <p:spPr>
+          <a:xfrm>
+            <a:off x="7561755" y="967931"/>
+            <a:ext cx="3312619" cy="2484465"/>
+          </a:xfrm>
+          <a:prstGeom prst="rect">
+            <a:avLst/>
+          </a:prstGeom>
+          <a:noFill/>
+          <a:ln>
+            <a:noFill/>
+          </a:ln>
+        </p:spPr>
+      </p:pic>
+      <p:pic>
+        <p:nvPicPr>
+          <p:cNvPr id="11" name="Picture 10">
+            <a:extLst>
+              <a:ext uri="{FF2B5EF4-FFF2-40B4-BE49-F238E27FC236}">
+                <a16:creationId xmlns:a16="http://schemas.microsoft.com/office/drawing/2014/main" id="{63763795-6781-420F-96F7-E89C759B4F75}"/>
+              </a:ext>
+            </a:extLst>
+          </p:cNvPr>
+          <p:cNvPicPr>
+            <a:picLocks noChangeAspect="1"/>
+          </p:cNvPicPr>
+          <p:nvPr/>
+        </p:nvPicPr>
+        <p:blipFill>
+          <a:blip r:embed="rId8">
+            <a:lum/>
+            <a:alphaModFix/>
+          </a:blip>
+          <a:srcRect/>
+          <a:stretch>
+            <a:fillRect/>
+          </a:stretch>
+        </p:blipFill>
+        <p:spPr>
+          <a:xfrm>
+            <a:off x="7532508" y="3524315"/>
+            <a:ext cx="3538580" cy="2652924"/>
+          </a:xfrm>
+          <a:prstGeom prst="rect">
+            <a:avLst/>
+          </a:prstGeom>
+          <a:noFill/>
+          <a:ln>
+            <a:noFill/>
+          </a:ln>
+        </p:spPr>
+      </p:pic>
+    </p:spTree>
+    <p:extLst>
+      <p:ext uri="{BB962C8B-B14F-4D97-AF65-F5344CB8AC3E}">
+        <p14:creationId xmlns:p14="http://schemas.microsoft.com/office/powerpoint/2010/main" val="2586653375"/>
+      </p:ext>
+    </p:extLst>
+  </p:cSld>
+  <p:clrMapOvr>
+    <a:masterClrMapping/>
+  </p:clrMapOvr>
+</p:sld>
+</file>
+
+<file path=ppt/slides/slide13.xml><?xml version="1.0" encoding="utf-8"?>
+<p:sld xmlns:a="http://schemas.openxmlformats.org/drawingml/2006/main" xmlns:r="http://schemas.openxmlformats.org/officeDocument/2006/relationships" xmlns:p="http://schemas.openxmlformats.org/presentationml/2006/main">
+  <p:cSld>
+    <p:spTree>
+      <p:nvGrpSpPr>
+        <p:cNvPr id="1" name=""/>
+        <p:cNvGrpSpPr/>
+        <p:nvPr/>
+      </p:nvGrpSpPr>
+      <p:grpSpPr>
+        <a:xfrm>
+          <a:off x="0" y="0"/>
+          <a:ext cx="0" cy="0"/>
+          <a:chOff x="0" y="0"/>
+          <a:chExt cx="0" cy="0"/>
+        </a:xfrm>
+      </p:grpSpPr>
+      <p:sp>
+        <p:nvSpPr>
+          <p:cNvPr id="2" name="Title 1">
+            <a:extLst>
+              <a:ext uri="{FF2B5EF4-FFF2-40B4-BE49-F238E27FC236}">
+                <a16:creationId xmlns:a16="http://schemas.microsoft.com/office/drawing/2014/main" id="{2C18C580-B900-4445-83CB-EAA1264D5543}"/>
+              </a:ext>
+            </a:extLst>
+          </p:cNvPr>
+          <p:cNvSpPr>
+            <a:spLocks noGrp="1"/>
+          </p:cNvSpPr>
+          <p:nvPr>
+            <p:ph type="title"/>
+          </p:nvPr>
+        </p:nvSpPr>
+        <p:spPr>
+          <a:xfrm>
+            <a:off x="838200" y="365125"/>
+            <a:ext cx="10515600" cy="625475"/>
+          </a:xfrm>
+        </p:spPr>
+        <p:txBody>
+          <a:bodyPr>
+            <a:normAutofit fontScale="90000"/>
+          </a:bodyPr>
+          <a:lstStyle/>
+          <a:p>
+            <a:r>
+              <a:rPr lang="en-CA"/>
+              <a:t>fine </a:t>
+            </a:r>
+            <a:r>
+              <a:rPr lang="en-CA" smtClean="0"/>
+              <a:t>structure </a:t>
+            </a:r>
+            <a:r>
+              <a:rPr lang="en-CA" dirty="0"/>
+              <a:t>distribution in mm-wave</a:t>
+            </a:r>
+          </a:p>
+        </p:txBody>
+      </p:sp>
+      <p:pic>
+        <p:nvPicPr>
+          <p:cNvPr id="4" name="Content Placeholder 3">
+            <a:extLst>
+              <a:ext uri="{FF2B5EF4-FFF2-40B4-BE49-F238E27FC236}">
+                <a16:creationId xmlns:a16="http://schemas.microsoft.com/office/drawing/2014/main" id="{CA9A7ACD-0022-44D5-A4CF-CCA6026BB701}"/>
+              </a:ext>
+            </a:extLst>
+          </p:cNvPr>
+          <p:cNvPicPr>
+            <a:picLocks noGrp="1" noChangeAspect="1"/>
+          </p:cNvPicPr>
+          <p:nvPr>
+            <p:ph idx="1"/>
+          </p:nvPr>
+        </p:nvPicPr>
+        <p:blipFill>
+          <a:blip r:embed="rId2"/>
+          <a:stretch>
+            <a:fillRect/>
+          </a:stretch>
+        </p:blipFill>
+        <p:spPr>
+          <a:xfrm>
+            <a:off x="481004" y="2336172"/>
+            <a:ext cx="4073935" cy="3055452"/>
+          </a:xfrm>
+          <a:prstGeom prst="rect">
+            <a:avLst/>
+          </a:prstGeom>
+        </p:spPr>
+      </p:pic>
+      <p:pic>
+        <p:nvPicPr>
+          <p:cNvPr id="6" name="Picture 5">
+            <a:extLst>
+              <a:ext uri="{FF2B5EF4-FFF2-40B4-BE49-F238E27FC236}">
+                <a16:creationId xmlns:a16="http://schemas.microsoft.com/office/drawing/2014/main" id="{A785CA7E-2038-4120-8847-A7C52E2521C9}"/>
+              </a:ext>
+            </a:extLst>
+          </p:cNvPr>
+          <p:cNvPicPr>
+            <a:picLocks noChangeAspect="1"/>
+          </p:cNvPicPr>
+          <p:nvPr/>
+        </p:nvPicPr>
+        <p:blipFill>
+          <a:blip r:embed="rId3"/>
+          <a:stretch>
+            <a:fillRect/>
+          </a:stretch>
+        </p:blipFill>
+        <p:spPr>
+          <a:xfrm>
+            <a:off x="4240472" y="2336172"/>
+            <a:ext cx="4044895" cy="3033672"/>
+          </a:xfrm>
+          <a:prstGeom prst="rect">
+            <a:avLst/>
+          </a:prstGeom>
+        </p:spPr>
+      </p:pic>
+      <p:sp>
+        <p:nvSpPr>
+          <p:cNvPr id="7" name="AutoShape 4">
+            <a:extLst>
+              <a:ext uri="{FF2B5EF4-FFF2-40B4-BE49-F238E27FC236}">
+                <a16:creationId xmlns:a16="http://schemas.microsoft.com/office/drawing/2014/main" id="{B5433A85-42FB-456E-A369-70031D57AC02}"/>
+              </a:ext>
+            </a:extLst>
+          </p:cNvPr>
+          <p:cNvSpPr>
+            <a:spLocks noChangeAspect="1" noChangeArrowheads="1"/>
+          </p:cNvSpPr>
+          <p:nvPr/>
+        </p:nvSpPr>
+        <p:spPr bwMode="auto">
+          <a:xfrm>
+            <a:off x="5943600" y="3276600"/>
+            <a:ext cx="304800" cy="304800"/>
+          </a:xfrm>
+          <a:prstGeom prst="rect">
+            <a:avLst/>
+          </a:prstGeom>
+          <a:noFill/>
+          <a:extLst>
+            <a:ext uri="{909E8E84-426E-40DD-AFC4-6F175D3DCCD1}">
+              <a14:hiddenFill xmlns:a14="http://schemas.microsoft.com/office/drawing/2010/main">
+                <a:solidFill>
+                  <a:srgbClr val="FFFFFF"/>
+                </a:solidFill>
+              </a14:hiddenFill>
+            </a:ext>
+          </a:extLst>
+        </p:spPr>
+        <p:txBody>
+          <a:bodyPr vert="horz" wrap="square" lIns="91440" tIns="45720" rIns="91440" bIns="45720" numCol="1" anchor="t" anchorCtr="0" compatLnSpc="1">
+            <a:prstTxWarp prst="textNoShape">
+              <a:avLst/>
+            </a:prstTxWarp>
+          </a:bodyPr>
+          <a:lstStyle/>
+          <a:p>
+            <a:endParaRPr lang="en-CA"/>
+          </a:p>
+        </p:txBody>
+      </p:sp>
+      <p:pic>
+        <p:nvPicPr>
+          <p:cNvPr id="9" name="Picture 8">
+            <a:extLst>
+              <a:ext uri="{FF2B5EF4-FFF2-40B4-BE49-F238E27FC236}">
+                <a16:creationId xmlns:a16="http://schemas.microsoft.com/office/drawing/2014/main" id="{3AAEE47A-EB3E-4392-915E-F85A4BDA6DB9}"/>
+              </a:ext>
+            </a:extLst>
+          </p:cNvPr>
+          <p:cNvPicPr>
+            <a:picLocks noChangeAspect="1"/>
+          </p:cNvPicPr>
+          <p:nvPr/>
+        </p:nvPicPr>
+        <p:blipFill>
+          <a:blip r:embed="rId4"/>
+          <a:stretch>
+            <a:fillRect/>
+          </a:stretch>
+        </p:blipFill>
+        <p:spPr>
+          <a:xfrm>
+            <a:off x="7970900" y="2336172"/>
+            <a:ext cx="4073935" cy="3055452"/>
+          </a:xfrm>
+          <a:prstGeom prst="rect">
+            <a:avLst/>
+          </a:prstGeom>
+        </p:spPr>
+      </p:pic>
+    </p:spTree>
+    <p:extLst>
+      <p:ext uri="{BB962C8B-B14F-4D97-AF65-F5344CB8AC3E}">
+        <p14:creationId xmlns:p14="http://schemas.microsoft.com/office/powerpoint/2010/main" val="3988722339"/>
+      </p:ext>
+    </p:extLst>
+  </p:cSld>
+  <p:clrMapOvr>
+    <a:masterClrMapping/>
+  </p:clrMapOvr>
+</p:sld>
+</file>
+
 <file path=ppt/slides/slide2.xml><?xml version="1.0" encoding="utf-8"?>
 <p:sld xmlns:a="http://schemas.openxmlformats.org/drawingml/2006/main" xmlns:r="http://schemas.openxmlformats.org/officeDocument/2006/relationships" xmlns:p="http://schemas.openxmlformats.org/presentationml/2006/main">
   <p:cSld>
@@ -3605,7 +4507,7 @@
           <p:cNvPr id="2" name="Title 1">
             <a:extLst>
               <a:ext uri="{FF2B5EF4-FFF2-40B4-BE49-F238E27FC236}">
-                <a16:creationId xmlns:a16="http://schemas.microsoft.com/office/drawing/2014/main" id="{E472C885-012C-471D-9E04-FF163E3A931C}"/>
+                <a16:creationId xmlns:a16="http://schemas.microsoft.com/office/drawing/2014/main" id="{E20261B7-C08D-4A22-816B-A78F9D70144A}"/>
               </a:ext>
             </a:extLst>
           </p:cNvPr>
@@ -3618,8 +4520,8 @@
         </p:nvSpPr>
         <p:spPr>
           <a:xfrm>
-            <a:off x="838200" y="365125"/>
-            <a:ext cx="10515600" cy="517525"/>
+            <a:off x="838200" y="365126"/>
+            <a:ext cx="10515600" cy="315912"/>
           </a:xfrm>
         </p:spPr>
         <p:txBody>
@@ -3629,10 +4531,9 @@
           <a:lstStyle/>
           <a:p>
             <a:r>
-              <a:rPr lang="en-US" dirty="0"/>
-              <a:t>Radio frequency field-induced electron mobility</a:t>
-            </a:r>
-            <a:endParaRPr lang="en-CA" dirty="0"/>
+              <a:rPr lang="en-CA" dirty="0"/>
+              <a:t>mm-wave Rydberg-Rydberg resonances</a:t>
+            </a:r>
           </a:p>
         </p:txBody>
       </p:sp>
@@ -3641,7 +4542,7 @@
           <p:cNvPr id="3" name="Content Placeholder 2">
             <a:extLst>
               <a:ext uri="{FF2B5EF4-FFF2-40B4-BE49-F238E27FC236}">
-                <a16:creationId xmlns:a16="http://schemas.microsoft.com/office/drawing/2014/main" id="{9CC014E3-0034-438B-8441-B4FBBE0AAC15}"/>
+                <a16:creationId xmlns:a16="http://schemas.microsoft.com/office/drawing/2014/main" id="{E23022AF-3A93-47BD-8859-105F8D681D75}"/>
               </a:ext>
             </a:extLst>
           </p:cNvPr>
@@ -3654,8 +4555,8 @@
         </p:nvSpPr>
         <p:spPr>
           <a:xfrm>
-            <a:off x="838200" y="1073150"/>
-            <a:ext cx="10515600" cy="5103813"/>
+            <a:off x="838200" y="819150"/>
+            <a:ext cx="10515600" cy="5357813"/>
           </a:xfrm>
         </p:spPr>
         <p:txBody>
@@ -3665,25 +4566,18 @@
           <a:lstStyle/>
           <a:p>
             <a:r>
-              <a:rPr lang="en-CA" sz="1200" b="0" i="0" dirty="0">
-                <a:solidFill>
-                  <a:srgbClr val="222222"/>
-                </a:solidFill>
-                <a:effectLst/>
-                <a:latin typeface="Helvetica Neue"/>
-              </a:rPr>
-              <a:t>PhysRevA.102.063122</a:t>
-            </a:r>
-            <a:endParaRPr lang="en-CA" sz="1800" dirty="0"/>
+              <a:rPr lang="en-CA" sz="1200" dirty="0"/>
+              <a:t>https://arxiv.org/pdf/2005.10088.pdf</a:t>
+            </a:r>
           </a:p>
         </p:txBody>
       </p:sp>
       <p:pic>
         <p:nvPicPr>
-          <p:cNvPr id="7" name="Picture 6">
-            <a:extLst>
-              <a:ext uri="{FF2B5EF4-FFF2-40B4-BE49-F238E27FC236}">
-                <a16:creationId xmlns:a16="http://schemas.microsoft.com/office/drawing/2014/main" id="{67B80717-D5D1-4255-BCE1-2CDCC7A8A387}"/>
+          <p:cNvPr id="5" name="Picture 4">
+            <a:extLst>
+              <a:ext uri="{FF2B5EF4-FFF2-40B4-BE49-F238E27FC236}">
+                <a16:creationId xmlns:a16="http://schemas.microsoft.com/office/drawing/2014/main" id="{04D83089-6A9E-4807-B54A-50962B6E86A0}"/>
               </a:ext>
             </a:extLst>
           </p:cNvPr>
@@ -3700,8 +4594,8 @@
         </p:blipFill>
         <p:spPr>
           <a:xfrm>
-            <a:off x="635616" y="1600353"/>
-            <a:ext cx="5000909" cy="3980051"/>
+            <a:off x="391252" y="1034632"/>
+            <a:ext cx="4478483" cy="4881671"/>
           </a:xfrm>
           <a:prstGeom prst="rect">
             <a:avLst/>
@@ -3710,10 +4604,10 @@
       </p:pic>
       <p:pic>
         <p:nvPicPr>
-          <p:cNvPr id="11" name="Picture 10">
-            <a:extLst>
-              <a:ext uri="{FF2B5EF4-FFF2-40B4-BE49-F238E27FC236}">
-                <a16:creationId xmlns:a16="http://schemas.microsoft.com/office/drawing/2014/main" id="{F57696D2-C5C9-48F7-B785-82DF955DAF14}"/>
+          <p:cNvPr id="7" name="Picture 6">
+            <a:extLst>
+              <a:ext uri="{FF2B5EF4-FFF2-40B4-BE49-F238E27FC236}">
+                <a16:creationId xmlns:a16="http://schemas.microsoft.com/office/drawing/2014/main" id="{CE389EF4-7834-436E-B1CC-0375809D140E}"/>
               </a:ext>
             </a:extLst>
           </p:cNvPr>
@@ -3730,8 +4624,8 @@
         </p:blipFill>
         <p:spPr>
           <a:xfrm>
-            <a:off x="6151374" y="1660183"/>
-            <a:ext cx="5000909" cy="3929746"/>
+            <a:off x="4869735" y="2685859"/>
+            <a:ext cx="3905226" cy="1275355"/>
           </a:xfrm>
           <a:prstGeom prst="rect">
             <a:avLst/>
@@ -3741,7 +4635,7 @@
     </p:spTree>
     <p:extLst>
       <p:ext uri="{BB962C8B-B14F-4D97-AF65-F5344CB8AC3E}">
-        <p14:creationId xmlns:p14="http://schemas.microsoft.com/office/powerpoint/2010/main" val="4241884963"/>
+        <p14:creationId xmlns:p14="http://schemas.microsoft.com/office/powerpoint/2010/main" val="1463174593"/>
       </p:ext>
     </p:extLst>
   </p:cSld>
@@ -3773,7 +4667,7 @@
           <p:cNvPr id="2" name="Title 1">
             <a:extLst>
               <a:ext uri="{FF2B5EF4-FFF2-40B4-BE49-F238E27FC236}">
-                <a16:creationId xmlns:a16="http://schemas.microsoft.com/office/drawing/2014/main" id="{E20261B7-C08D-4A22-816B-A78F9D70144A}"/>
+                <a16:creationId xmlns:a16="http://schemas.microsoft.com/office/drawing/2014/main" id="{E472C885-012C-471D-9E04-FF163E3A931C}"/>
               </a:ext>
             </a:extLst>
           </p:cNvPr>
@@ -3786,8 +4680,8 @@
         </p:nvSpPr>
         <p:spPr>
           <a:xfrm>
-            <a:off x="838200" y="365126"/>
-            <a:ext cx="10515600" cy="315912"/>
+            <a:off x="838200" y="365125"/>
+            <a:ext cx="10515600" cy="517525"/>
           </a:xfrm>
         </p:spPr>
         <p:txBody>
@@ -3797,9 +4691,10 @@
           <a:lstStyle/>
           <a:p>
             <a:r>
-              <a:rPr lang="en-CA" dirty="0"/>
-              <a:t>mm-wave Rydberg-Rydberg resonances</a:t>
-            </a:r>
+              <a:rPr lang="en-US" dirty="0"/>
+              <a:t>Radio frequency field-induced electron mobility</a:t>
+            </a:r>
+            <a:endParaRPr lang="en-CA" dirty="0"/>
           </a:p>
         </p:txBody>
       </p:sp>
@@ -3808,7 +4703,7 @@
           <p:cNvPr id="3" name="Content Placeholder 2">
             <a:extLst>
               <a:ext uri="{FF2B5EF4-FFF2-40B4-BE49-F238E27FC236}">
-                <a16:creationId xmlns:a16="http://schemas.microsoft.com/office/drawing/2014/main" id="{E23022AF-3A93-47BD-8859-105F8D681D75}"/>
+                <a16:creationId xmlns:a16="http://schemas.microsoft.com/office/drawing/2014/main" id="{9CC014E3-0034-438B-8441-B4FBBE0AAC15}"/>
               </a:ext>
             </a:extLst>
           </p:cNvPr>
@@ -3821,8 +4716,8 @@
         </p:nvSpPr>
         <p:spPr>
           <a:xfrm>
-            <a:off x="838200" y="819150"/>
-            <a:ext cx="10515600" cy="5357813"/>
+            <a:off x="838200" y="1073150"/>
+            <a:ext cx="10515600" cy="5103813"/>
           </a:xfrm>
         </p:spPr>
         <p:txBody>
@@ -3832,18 +4727,25 @@
           <a:lstStyle/>
           <a:p>
             <a:r>
-              <a:rPr lang="en-CA" sz="1200" dirty="0"/>
-              <a:t>https://arxiv.org/pdf/2005.10088.pdf</a:t>
-            </a:r>
+              <a:rPr lang="en-CA" sz="1200" b="0" i="0" dirty="0">
+                <a:solidFill>
+                  <a:srgbClr val="222222"/>
+                </a:solidFill>
+                <a:effectLst/>
+                <a:latin typeface="Helvetica Neue"/>
+              </a:rPr>
+              <a:t>PhysRevA.102.063122</a:t>
+            </a:r>
+            <a:endParaRPr lang="en-CA" sz="1800" dirty="0"/>
           </a:p>
         </p:txBody>
       </p:sp>
       <p:pic>
         <p:nvPicPr>
-          <p:cNvPr id="5" name="Picture 4">
-            <a:extLst>
-              <a:ext uri="{FF2B5EF4-FFF2-40B4-BE49-F238E27FC236}">
-                <a16:creationId xmlns:a16="http://schemas.microsoft.com/office/drawing/2014/main" id="{04D83089-6A9E-4807-B54A-50962B6E86A0}"/>
+          <p:cNvPr id="7" name="Picture 6">
+            <a:extLst>
+              <a:ext uri="{FF2B5EF4-FFF2-40B4-BE49-F238E27FC236}">
+                <a16:creationId xmlns:a16="http://schemas.microsoft.com/office/drawing/2014/main" id="{67B80717-D5D1-4255-BCE1-2CDCC7A8A387}"/>
               </a:ext>
             </a:extLst>
           </p:cNvPr>
@@ -3860,8 +4762,8 @@
         </p:blipFill>
         <p:spPr>
           <a:xfrm>
-            <a:off x="391252" y="1034632"/>
-            <a:ext cx="4478483" cy="4881671"/>
+            <a:off x="635616" y="1600353"/>
+            <a:ext cx="5000909" cy="3980051"/>
           </a:xfrm>
           <a:prstGeom prst="rect">
             <a:avLst/>
@@ -3870,10 +4772,10 @@
       </p:pic>
       <p:pic>
         <p:nvPicPr>
-          <p:cNvPr id="7" name="Picture 6">
-            <a:extLst>
-              <a:ext uri="{FF2B5EF4-FFF2-40B4-BE49-F238E27FC236}">
-                <a16:creationId xmlns:a16="http://schemas.microsoft.com/office/drawing/2014/main" id="{CE389EF4-7834-436E-B1CC-0375809D140E}"/>
+          <p:cNvPr id="11" name="Picture 10">
+            <a:extLst>
+              <a:ext uri="{FF2B5EF4-FFF2-40B4-BE49-F238E27FC236}">
+                <a16:creationId xmlns:a16="http://schemas.microsoft.com/office/drawing/2014/main" id="{F57696D2-C5C9-48F7-B785-82DF955DAF14}"/>
               </a:ext>
             </a:extLst>
           </p:cNvPr>
@@ -3890,8 +4792,8 @@
         </p:blipFill>
         <p:spPr>
           <a:xfrm>
-            <a:off x="4869735" y="2685859"/>
-            <a:ext cx="3905226" cy="1275355"/>
+            <a:off x="6151374" y="1660183"/>
+            <a:ext cx="5000909" cy="3929746"/>
           </a:xfrm>
           <a:prstGeom prst="rect">
             <a:avLst/>
@@ -3901,7 +4803,7 @@
     </p:spTree>
     <p:extLst>
       <p:ext uri="{BB962C8B-B14F-4D97-AF65-F5344CB8AC3E}">
-        <p14:creationId xmlns:p14="http://schemas.microsoft.com/office/powerpoint/2010/main" val="1463174593"/>
+        <p14:creationId xmlns:p14="http://schemas.microsoft.com/office/powerpoint/2010/main" val="4241884963"/>
       </p:ext>
     </p:extLst>
   </p:cSld>
@@ -3928,12 +4830,174 @@
           <a:chExt cx="0" cy="0"/>
         </a:xfrm>
       </p:grpSpPr>
+      <p:sp>
+        <p:nvSpPr>
+          <p:cNvPr id="2" name="Title 1">
+            <a:extLst>
+              <a:ext uri="{FF2B5EF4-FFF2-40B4-BE49-F238E27FC236}">
+                <a16:creationId xmlns:a16="http://schemas.microsoft.com/office/drawing/2014/main" id="{ECFEA841-EF7F-478D-A4EC-0BC53B51221A}"/>
+              </a:ext>
+            </a:extLst>
+          </p:cNvPr>
+          <p:cNvSpPr>
+            <a:spLocks noGrp="1"/>
+          </p:cNvSpPr>
+          <p:nvPr>
+            <p:ph type="title"/>
+          </p:nvPr>
+        </p:nvSpPr>
+        <p:spPr>
+          <a:xfrm>
+            <a:off x="838200" y="365125"/>
+            <a:ext cx="10515600" cy="676275"/>
+          </a:xfrm>
+        </p:spPr>
+        <p:txBody>
+          <a:bodyPr>
+            <a:normAutofit fontScale="90000"/>
+          </a:bodyPr>
+          <a:lstStyle/>
+          <a:p>
+            <a:r>
+              <a:rPr lang="en-CA" dirty="0"/>
+              <a:t>Model</a:t>
+            </a:r>
+          </a:p>
+        </p:txBody>
+      </p:sp>
+      <p:sp>
+        <p:nvSpPr>
+          <p:cNvPr id="3" name="Content Placeholder 2">
+            <a:extLst>
+              <a:ext uri="{FF2B5EF4-FFF2-40B4-BE49-F238E27FC236}">
+                <a16:creationId xmlns:a16="http://schemas.microsoft.com/office/drawing/2014/main" id="{AD74EEDD-E6DB-4093-8EE6-CB2B4C53BAD9}"/>
+              </a:ext>
+            </a:extLst>
+          </p:cNvPr>
+          <p:cNvSpPr>
+            <a:spLocks noGrp="1"/>
+          </p:cNvSpPr>
+          <p:nvPr>
+            <p:ph idx="1"/>
+          </p:nvPr>
+        </p:nvSpPr>
+        <p:spPr>
+          <a:xfrm>
+            <a:off x="838200" y="1041400"/>
+            <a:ext cx="10515600" cy="5135563"/>
+          </a:xfrm>
+        </p:spPr>
+        <p:txBody>
+          <a:bodyPr>
+            <a:normAutofit/>
+          </a:bodyPr>
+          <a:lstStyle/>
+          <a:p>
+            <a:r>
+              <a:rPr lang="en-US" sz="1100" b="0" i="0" dirty="0">
+                <a:solidFill>
+                  <a:srgbClr val="333333"/>
+                </a:solidFill>
+                <a:effectLst/>
+                <a:latin typeface="-apple-system"/>
+              </a:rPr>
+              <a:t> </a:t>
+            </a:r>
+            <a:r>
+              <a:rPr lang="en-US" sz="1100" b="0" i="1" dirty="0">
+                <a:solidFill>
+                  <a:srgbClr val="333333"/>
+                </a:solidFill>
+                <a:effectLst/>
+                <a:latin typeface="-apple-system"/>
+              </a:rPr>
+              <a:t>New J. Phys.</a:t>
+            </a:r>
+            <a:r>
+              <a:rPr lang="en-US" sz="1100" b="0" i="0" dirty="0">
+                <a:solidFill>
+                  <a:srgbClr val="333333"/>
+                </a:solidFill>
+                <a:effectLst/>
+                <a:latin typeface="-apple-system"/>
+              </a:rPr>
+              <a:t> </a:t>
+            </a:r>
+            <a:r>
+              <a:rPr lang="en-US" sz="1100" b="1" i="0" dirty="0">
+                <a:solidFill>
+                  <a:srgbClr val="333333"/>
+                </a:solidFill>
+                <a:effectLst/>
+                <a:latin typeface="-apple-system"/>
+              </a:rPr>
+              <a:t>21</a:t>
+            </a:r>
+            <a:r>
+              <a:rPr lang="en-US" sz="1100" b="0" i="0" dirty="0">
+                <a:solidFill>
+                  <a:srgbClr val="333333"/>
+                </a:solidFill>
+                <a:effectLst/>
+                <a:latin typeface="-apple-system"/>
+              </a:rPr>
+              <a:t> 043033</a:t>
+            </a:r>
+          </a:p>
+          <a:p>
+            <a:r>
+              <a:rPr lang="en-CA" sz="1100" b="0" i="0" dirty="0">
+                <a:effectLst/>
+                <a:latin typeface="Arial" panose="020B0604020202020204" pitchFamily="34" charset="0"/>
+              </a:rPr>
+              <a:t>Phys. Rev. Lett.120, 110601</a:t>
+            </a:r>
+          </a:p>
+          <a:p>
+            <a:endParaRPr lang="en-CA" sz="1100" dirty="0">
+              <a:latin typeface="Arial" panose="020B0604020202020204" pitchFamily="34" charset="0"/>
+            </a:endParaRPr>
+          </a:p>
+          <a:p>
+            <a:endParaRPr lang="en-CA" sz="1100" dirty="0">
+              <a:latin typeface="Arial" panose="020B0604020202020204" pitchFamily="34" charset="0"/>
+            </a:endParaRPr>
+          </a:p>
+          <a:p>
+            <a:r>
+              <a:rPr lang="en-CA" sz="1800" dirty="0"/>
+              <a:t>1D spin chain</a:t>
+            </a:r>
+          </a:p>
+          <a:p>
+            <a:endParaRPr lang="en-CA" sz="1800" dirty="0"/>
+          </a:p>
+          <a:p>
+            <a:endParaRPr lang="en-CA" sz="1800" dirty="0"/>
+          </a:p>
+          <a:p>
+            <a:endParaRPr lang="en-CA" sz="1800" dirty="0"/>
+          </a:p>
+          <a:p>
+            <a:endParaRPr lang="en-CA" sz="1800" dirty="0"/>
+          </a:p>
+          <a:p>
+            <a:endParaRPr lang="en-CA" sz="1800" dirty="0"/>
+          </a:p>
+          <a:p>
+            <a:r>
+              <a:rPr lang="en-CA" sz="1800" dirty="0"/>
+              <a:t>Lindblad dynamics</a:t>
+            </a:r>
+          </a:p>
+        </p:txBody>
+      </p:sp>
       <p:pic>
         <p:nvPicPr>
-          <p:cNvPr id="12" name="Content Placeholder 3">
-            <a:extLst>
-              <a:ext uri="{FF2B5EF4-FFF2-40B4-BE49-F238E27FC236}">
-                <a16:creationId xmlns:a16="http://schemas.microsoft.com/office/drawing/2014/main" id="{B4B289DF-26CB-49C4-93FA-410B41D42098}"/>
+          <p:cNvPr id="5" name="Picture 4">
+            <a:extLst>
+              <a:ext uri="{FF2B5EF4-FFF2-40B4-BE49-F238E27FC236}">
+                <a16:creationId xmlns:a16="http://schemas.microsoft.com/office/drawing/2014/main" id="{2109D75D-E1A6-4FFE-AA0D-612E7858E274}"/>
               </a:ext>
             </a:extLst>
           </p:cNvPr>
@@ -3950,45 +5014,20 @@
         </p:blipFill>
         <p:spPr>
           <a:xfrm>
-            <a:off x="508000" y="908050"/>
-            <a:ext cx="3975100" cy="2677140"/>
+            <a:off x="3107175" y="1771179"/>
+            <a:ext cx="6357548" cy="1469344"/>
           </a:xfrm>
           <a:prstGeom prst="rect">
             <a:avLst/>
           </a:prstGeom>
         </p:spPr>
       </p:pic>
-      <p:sp>
-        <p:nvSpPr>
-          <p:cNvPr id="3" name="Content Placeholder 2">
-            <a:extLst>
-              <a:ext uri="{FF2B5EF4-FFF2-40B4-BE49-F238E27FC236}">
-                <a16:creationId xmlns:a16="http://schemas.microsoft.com/office/drawing/2014/main" id="{6420A58B-D009-4A53-929D-AB30E8B37EA2}"/>
-              </a:ext>
-            </a:extLst>
-          </p:cNvPr>
-          <p:cNvSpPr>
-            <a:spLocks noGrp="1"/>
-          </p:cNvSpPr>
-          <p:nvPr>
-            <p:ph idx="1"/>
-          </p:nvPr>
-        </p:nvSpPr>
-        <p:spPr/>
-        <p:txBody>
-          <a:bodyPr/>
-          <a:lstStyle/>
-          <a:p>
-            <a:endParaRPr lang="en-CA" dirty="0"/>
-          </a:p>
-        </p:txBody>
-      </p:sp>
       <p:pic>
         <p:nvPicPr>
-          <p:cNvPr id="4" name="Picture 3">
-            <a:extLst>
-              <a:ext uri="{FF2B5EF4-FFF2-40B4-BE49-F238E27FC236}">
-                <a16:creationId xmlns:a16="http://schemas.microsoft.com/office/drawing/2014/main" id="{6176BA02-31BE-43D8-9736-CBF535B6AC8C}"/>
+          <p:cNvPr id="7" name="Picture 6">
+            <a:extLst>
+              <a:ext uri="{FF2B5EF4-FFF2-40B4-BE49-F238E27FC236}">
+                <a16:creationId xmlns:a16="http://schemas.microsoft.com/office/drawing/2014/main" id="{3560F8E1-8B09-4C46-8196-693E6780025C}"/>
               </a:ext>
             </a:extLst>
           </p:cNvPr>
@@ -3998,35 +5037,27 @@
           <p:nvPr/>
         </p:nvPicPr>
         <p:blipFill>
-          <a:blip r:embed="rId3">
-            <a:lum/>
-            <a:alphaModFix/>
-          </a:blip>
-          <a:srcRect/>
+          <a:blip r:embed="rId3"/>
           <a:stretch>
             <a:fillRect/>
           </a:stretch>
         </p:blipFill>
         <p:spPr>
           <a:xfrm>
-            <a:off x="930654" y="3650542"/>
-            <a:ext cx="3282950" cy="2461069"/>
+            <a:off x="5095236" y="3346015"/>
+            <a:ext cx="3939584" cy="521319"/>
           </a:xfrm>
           <a:prstGeom prst="rect">
             <a:avLst/>
           </a:prstGeom>
-          <a:noFill/>
-          <a:ln>
-            <a:noFill/>
-          </a:ln>
         </p:spPr>
       </p:pic>
       <p:pic>
         <p:nvPicPr>
-          <p:cNvPr id="5" name="Picture 4">
-            <a:extLst>
-              <a:ext uri="{FF2B5EF4-FFF2-40B4-BE49-F238E27FC236}">
-                <a16:creationId xmlns:a16="http://schemas.microsoft.com/office/drawing/2014/main" id="{172EA10B-95C8-4DE8-AA64-60BF133137AD}"/>
+          <p:cNvPr id="13" name="Picture 12">
+            <a:extLst>
+              <a:ext uri="{FF2B5EF4-FFF2-40B4-BE49-F238E27FC236}">
+                <a16:creationId xmlns:a16="http://schemas.microsoft.com/office/drawing/2014/main" id="{92284C03-5A4C-47E3-B43F-4F192F845875}"/>
               </a:ext>
             </a:extLst>
           </p:cNvPr>
@@ -4036,220 +5067,25 @@
           <p:nvPr/>
         </p:nvPicPr>
         <p:blipFill>
-          <a:blip r:embed="rId4">
-            <a:lum/>
-            <a:alphaModFix/>
-          </a:blip>
-          <a:srcRect/>
+          <a:blip r:embed="rId4"/>
           <a:stretch>
             <a:fillRect/>
           </a:stretch>
         </p:blipFill>
         <p:spPr>
           <a:xfrm>
-            <a:off x="808953" y="967931"/>
-            <a:ext cx="3312197" cy="2484463"/>
+            <a:off x="2936615" y="4083056"/>
+            <a:ext cx="6876125" cy="1223009"/>
           </a:xfrm>
           <a:prstGeom prst="rect">
             <a:avLst/>
           </a:prstGeom>
-          <a:noFill/>
-          <a:ln>
-            <a:noFill/>
-          </a:ln>
-        </p:spPr>
-      </p:pic>
-      <p:sp>
-        <p:nvSpPr>
-          <p:cNvPr id="7" name="Title 1">
-            <a:extLst>
-              <a:ext uri="{FF2B5EF4-FFF2-40B4-BE49-F238E27FC236}">
-                <a16:creationId xmlns:a16="http://schemas.microsoft.com/office/drawing/2014/main" id="{99227E0B-1E7A-490D-B1DF-D3B71D2BF331}"/>
-              </a:ext>
-            </a:extLst>
-          </p:cNvPr>
-          <p:cNvSpPr>
-            <a:spLocks noGrp="1"/>
-          </p:cNvSpPr>
-          <p:nvPr>
-            <p:ph type="title"/>
-          </p:nvPr>
-        </p:nvSpPr>
-        <p:spPr>
-          <a:xfrm>
-            <a:off x="838200" y="365125"/>
-            <a:ext cx="10515600" cy="212725"/>
-          </a:xfrm>
-        </p:spPr>
-        <p:txBody>
-          <a:bodyPr>
-            <a:normAutofit fontScale="90000"/>
-          </a:bodyPr>
-          <a:lstStyle/>
-          <a:p>
-            <a:r>
-              <a:rPr lang="en-CA" dirty="0"/>
-              <a:t>fine structure distribution in mm-wave</a:t>
-            </a:r>
-          </a:p>
-        </p:txBody>
-      </p:sp>
-      <p:pic>
-        <p:nvPicPr>
-          <p:cNvPr id="8" name="Picture 7">
-            <a:extLst>
-              <a:ext uri="{FF2B5EF4-FFF2-40B4-BE49-F238E27FC236}">
-                <a16:creationId xmlns:a16="http://schemas.microsoft.com/office/drawing/2014/main" id="{8BEDD287-16F2-453E-B4AD-717CAAB1C7B6}"/>
-              </a:ext>
-            </a:extLst>
-          </p:cNvPr>
-          <p:cNvPicPr>
-            <a:picLocks noChangeAspect="1"/>
-          </p:cNvPicPr>
-          <p:nvPr/>
-        </p:nvPicPr>
-        <p:blipFill>
-          <a:blip r:embed="rId5">
-            <a:lum/>
-            <a:alphaModFix/>
-          </a:blip>
-          <a:srcRect/>
-          <a:stretch>
-            <a:fillRect/>
-          </a:stretch>
-        </p:blipFill>
-        <p:spPr>
-          <a:xfrm>
-            <a:off x="4219889" y="967931"/>
-            <a:ext cx="3312619" cy="2484464"/>
-          </a:xfrm>
-          <a:prstGeom prst="rect">
-            <a:avLst/>
-          </a:prstGeom>
-          <a:noFill/>
-          <a:ln>
-            <a:noFill/>
-          </a:ln>
-        </p:spPr>
-      </p:pic>
-      <p:pic>
-        <p:nvPicPr>
-          <p:cNvPr id="9" name="Picture 8">
-            <a:extLst>
-              <a:ext uri="{FF2B5EF4-FFF2-40B4-BE49-F238E27FC236}">
-                <a16:creationId xmlns:a16="http://schemas.microsoft.com/office/drawing/2014/main" id="{5574D827-11F2-4832-93FC-B59B7AEC8F97}"/>
-              </a:ext>
-            </a:extLst>
-          </p:cNvPr>
-          <p:cNvPicPr>
-            <a:picLocks noChangeAspect="1"/>
-          </p:cNvPicPr>
-          <p:nvPr/>
-        </p:nvPicPr>
-        <p:blipFill>
-          <a:blip r:embed="rId6">
-            <a:lum/>
-            <a:alphaModFix/>
-          </a:blip>
-          <a:srcRect/>
-          <a:stretch>
-            <a:fillRect/>
-          </a:stretch>
-        </p:blipFill>
-        <p:spPr>
-          <a:xfrm>
-            <a:off x="4228227" y="3524316"/>
-            <a:ext cx="3538580" cy="2652647"/>
-          </a:xfrm>
-          <a:prstGeom prst="rect">
-            <a:avLst/>
-          </a:prstGeom>
-          <a:noFill/>
-          <a:ln>
-            <a:noFill/>
-          </a:ln>
-        </p:spPr>
-      </p:pic>
-      <p:pic>
-        <p:nvPicPr>
-          <p:cNvPr id="10" name="Picture 9">
-            <a:extLst>
-              <a:ext uri="{FF2B5EF4-FFF2-40B4-BE49-F238E27FC236}">
-                <a16:creationId xmlns:a16="http://schemas.microsoft.com/office/drawing/2014/main" id="{54002C32-69F0-4BD8-BE73-9D76CC6CE08F}"/>
-              </a:ext>
-            </a:extLst>
-          </p:cNvPr>
-          <p:cNvPicPr>
-            <a:picLocks noChangeAspect="1"/>
-          </p:cNvPicPr>
-          <p:nvPr/>
-        </p:nvPicPr>
-        <p:blipFill>
-          <a:blip r:embed="rId7">
-            <a:lum/>
-            <a:alphaModFix/>
-          </a:blip>
-          <a:srcRect/>
-          <a:stretch>
-            <a:fillRect/>
-          </a:stretch>
-        </p:blipFill>
-        <p:spPr>
-          <a:xfrm>
-            <a:off x="7561755" y="967931"/>
-            <a:ext cx="3312619" cy="2484465"/>
-          </a:xfrm>
-          <a:prstGeom prst="rect">
-            <a:avLst/>
-          </a:prstGeom>
-          <a:noFill/>
-          <a:ln>
-            <a:noFill/>
-          </a:ln>
-        </p:spPr>
-      </p:pic>
-      <p:pic>
-        <p:nvPicPr>
-          <p:cNvPr id="11" name="Picture 10">
-            <a:extLst>
-              <a:ext uri="{FF2B5EF4-FFF2-40B4-BE49-F238E27FC236}">
-                <a16:creationId xmlns:a16="http://schemas.microsoft.com/office/drawing/2014/main" id="{63763795-6781-420F-96F7-E89C759B4F75}"/>
-              </a:ext>
-            </a:extLst>
-          </p:cNvPr>
-          <p:cNvPicPr>
-            <a:picLocks noChangeAspect="1"/>
-          </p:cNvPicPr>
-          <p:nvPr/>
-        </p:nvPicPr>
-        <p:blipFill>
-          <a:blip r:embed="rId8">
-            <a:lum/>
-            <a:alphaModFix/>
-          </a:blip>
-          <a:srcRect/>
-          <a:stretch>
-            <a:fillRect/>
-          </a:stretch>
-        </p:blipFill>
-        <p:spPr>
-          <a:xfrm>
-            <a:off x="7532508" y="3524315"/>
-            <a:ext cx="3538580" cy="2652924"/>
-          </a:xfrm>
-          <a:prstGeom prst="rect">
-            <a:avLst/>
-          </a:prstGeom>
-          <a:noFill/>
-          <a:ln>
-            <a:noFill/>
-          </a:ln>
         </p:spPr>
       </p:pic>
     </p:spTree>
     <p:extLst>
       <p:ext uri="{BB962C8B-B14F-4D97-AF65-F5344CB8AC3E}">
-        <p14:creationId xmlns:p14="http://schemas.microsoft.com/office/powerpoint/2010/main" val="2586653375"/>
+        <p14:creationId xmlns:p14="http://schemas.microsoft.com/office/powerpoint/2010/main" val="976939348"/>
       </p:ext>
     </p:extLst>
   </p:cSld>
@@ -4281,7 +5117,7 @@
           <p:cNvPr id="2" name="Title 1">
             <a:extLst>
               <a:ext uri="{FF2B5EF4-FFF2-40B4-BE49-F238E27FC236}">
-                <a16:creationId xmlns:a16="http://schemas.microsoft.com/office/drawing/2014/main" id="{2C18C580-B900-4445-83CB-EAA1264D5543}"/>
+                <a16:creationId xmlns:a16="http://schemas.microsoft.com/office/drawing/2014/main" id="{551809E3-9188-4AAC-9E1B-88FFE3850BAC}"/>
               </a:ext>
             </a:extLst>
           </p:cNvPr>
@@ -4294,38 +5130,93 @@
         </p:nvSpPr>
         <p:spPr>
           <a:xfrm>
-            <a:off x="838200" y="365125"/>
-            <a:ext cx="10515600" cy="625475"/>
+            <a:off x="838200" y="365126"/>
+            <a:ext cx="10352714" cy="111372"/>
           </a:xfrm>
         </p:spPr>
         <p:txBody>
           <a:bodyPr>
-            <a:normAutofit fontScale="90000"/>
+            <a:noAutofit/>
           </a:bodyPr>
           <a:lstStyle/>
           <a:p>
             <a:r>
-              <a:rPr lang="en-CA" dirty="0"/>
-              <a:t>fine structure distribution in mm-wave</a:t>
-            </a:r>
+              <a:rPr lang="en-CA" sz="2800" dirty="0"/>
+              <a:t>Results of solving </a:t>
+            </a:r>
+            <a:r>
+              <a:rPr lang="en-CA" sz="2800" dirty="0" err="1"/>
+              <a:t>Lindblad</a:t>
+            </a:r>
+            <a:r>
+              <a:rPr lang="en-CA" sz="2800" dirty="0"/>
+              <a:t> equation N=7 </a:t>
+            </a:r>
+            <a:endParaRPr lang="en-CA" sz="2800" dirty="0"/>
+          </a:p>
+        </p:txBody>
+      </p:sp>
+      <p:sp>
+        <p:nvSpPr>
+          <p:cNvPr id="3" name="Content Placeholder 2">
+            <a:extLst>
+              <a:ext uri="{FF2B5EF4-FFF2-40B4-BE49-F238E27FC236}">
+                <a16:creationId xmlns:a16="http://schemas.microsoft.com/office/drawing/2014/main" id="{0CBD35D4-E87E-4006-A6A5-9062C6FAAEE4}"/>
+              </a:ext>
+            </a:extLst>
+          </p:cNvPr>
+          <p:cNvSpPr>
+            <a:spLocks noGrp="1"/>
+          </p:cNvSpPr>
+          <p:nvPr>
+            <p:ph idx="1"/>
+          </p:nvPr>
+        </p:nvSpPr>
+        <p:spPr>
+          <a:xfrm>
+            <a:off x="838200" y="1031846"/>
+            <a:ext cx="10515600" cy="5145117"/>
+          </a:xfrm>
+        </p:spPr>
+        <p:txBody>
+          <a:bodyPr>
+            <a:normAutofit/>
+          </a:bodyPr>
+          <a:lstStyle/>
+          <a:p>
+            <a:r>
+              <a:rPr lang="en-CA" sz="1600" dirty="0" smtClean="0"/>
+              <a:t>Constant onsite energies W=1</a:t>
+            </a:r>
+          </a:p>
+          <a:p>
+            <a:r>
+              <a:rPr lang="en-CA" sz="1600" dirty="0" smtClean="0"/>
+              <a:t> J=0.15 is scaled with distance by r^-3</a:t>
+            </a:r>
+          </a:p>
+          <a:p>
+            <a:r>
+              <a:rPr lang="en-CA" sz="1600" dirty="0" smtClean="0"/>
+              <a:t>Loss from center</a:t>
+            </a:r>
+          </a:p>
+          <a:p>
+            <a:r>
+              <a:rPr lang="en-CA" sz="1600" dirty="0" smtClean="0"/>
+              <a:t>Random initial density</a:t>
+            </a:r>
+            <a:endParaRPr lang="en-CA" sz="1600" dirty="0"/>
           </a:p>
         </p:txBody>
       </p:sp>
       <p:pic>
         <p:nvPicPr>
-          <p:cNvPr id="4" name="Content Placeholder 3">
-            <a:extLst>
-              <a:ext uri="{FF2B5EF4-FFF2-40B4-BE49-F238E27FC236}">
-                <a16:creationId xmlns:a16="http://schemas.microsoft.com/office/drawing/2014/main" id="{CA9A7ACD-0022-44D5-A4CF-CCA6026BB701}"/>
-              </a:ext>
-            </a:extLst>
-          </p:cNvPr>
+          <p:cNvPr id="4" name="Content Placeholder 3"/>
           <p:cNvPicPr>
-            <a:picLocks noGrp="1" noChangeAspect="1"/>
+            <a:picLocks noChangeAspect="1"/>
           </p:cNvPicPr>
-          <p:nvPr>
-            <p:ph idx="1"/>
-          </p:nvPr>
+          <p:nvPr/>
         </p:nvPicPr>
         <p:blipFill>
           <a:blip r:embed="rId2"/>
@@ -4335,8 +5226,8 @@
         </p:blipFill>
         <p:spPr>
           <a:xfrm>
-            <a:off x="481004" y="2336172"/>
-            <a:ext cx="4073935" cy="3055452"/>
+            <a:off x="6299514" y="589797"/>
+            <a:ext cx="2729908" cy="1975035"/>
           </a:xfrm>
           <a:prstGeom prst="rect">
             <a:avLst/>
@@ -4345,13 +5236,7 @@
       </p:pic>
       <p:pic>
         <p:nvPicPr>
-          <p:cNvPr id="6" name="Picture 5">
-            <a:extLst>
-              <a:ext uri="{FF2B5EF4-FFF2-40B4-BE49-F238E27FC236}">
-                <a16:creationId xmlns:a16="http://schemas.microsoft.com/office/drawing/2014/main" id="{A785CA7E-2038-4120-8847-A7C52E2521C9}"/>
-              </a:ext>
-            </a:extLst>
-          </p:cNvPr>
+          <p:cNvPr id="5" name="Picture 4"/>
           <p:cNvPicPr>
             <a:picLocks noChangeAspect="1"/>
           </p:cNvPicPr>
@@ -4365,68 +5250,17 @@
         </p:blipFill>
         <p:spPr>
           <a:xfrm>
-            <a:off x="4240472" y="2336172"/>
-            <a:ext cx="4044895" cy="3033672"/>
+            <a:off x="460866" y="2535401"/>
+            <a:ext cx="2696353" cy="1892607"/>
           </a:xfrm>
           <a:prstGeom prst="rect">
             <a:avLst/>
           </a:prstGeom>
         </p:spPr>
       </p:pic>
-      <p:sp>
-        <p:nvSpPr>
-          <p:cNvPr id="7" name="AutoShape 4">
-            <a:extLst>
-              <a:ext uri="{FF2B5EF4-FFF2-40B4-BE49-F238E27FC236}">
-                <a16:creationId xmlns:a16="http://schemas.microsoft.com/office/drawing/2014/main" id="{B5433A85-42FB-456E-A369-70031D57AC02}"/>
-              </a:ext>
-            </a:extLst>
-          </p:cNvPr>
-          <p:cNvSpPr>
-            <a:spLocks noChangeAspect="1" noChangeArrowheads="1"/>
-          </p:cNvSpPr>
-          <p:nvPr/>
-        </p:nvSpPr>
-        <p:spPr bwMode="auto">
-          <a:xfrm>
-            <a:off x="5943600" y="3276600"/>
-            <a:ext cx="304800" cy="304800"/>
-          </a:xfrm>
-          <a:prstGeom prst="rect">
-            <a:avLst/>
-          </a:prstGeom>
-          <a:noFill/>
-          <a:extLst>
-            <a:ext uri="{909E8E84-426E-40DD-AFC4-6F175D3DCCD1}">
-              <a14:hiddenFill xmlns:a14="http://schemas.microsoft.com/office/drawing/2010/main">
-                <a:solidFill>
-                  <a:srgbClr val="FFFFFF"/>
-                </a:solidFill>
-              </a14:hiddenFill>
-            </a:ext>
-          </a:extLst>
-        </p:spPr>
-        <p:txBody>
-          <a:bodyPr vert="horz" wrap="square" lIns="91440" tIns="45720" rIns="91440" bIns="45720" numCol="1" anchor="t" anchorCtr="0" compatLnSpc="1">
-            <a:prstTxWarp prst="textNoShape">
-              <a:avLst/>
-            </a:prstTxWarp>
-          </a:bodyPr>
-          <a:lstStyle/>
-          <a:p>
-            <a:endParaRPr lang="en-CA"/>
-          </a:p>
-        </p:txBody>
-      </p:sp>
       <p:pic>
         <p:nvPicPr>
-          <p:cNvPr id="9" name="Picture 8">
-            <a:extLst>
-              <a:ext uri="{FF2B5EF4-FFF2-40B4-BE49-F238E27FC236}">
-                <a16:creationId xmlns:a16="http://schemas.microsoft.com/office/drawing/2014/main" id="{3AAEE47A-EB3E-4392-915E-F85A4BDA6DB9}"/>
-              </a:ext>
-            </a:extLst>
-          </p:cNvPr>
+          <p:cNvPr id="6" name="Picture 5"/>
           <p:cNvPicPr>
             <a:picLocks noChangeAspect="1"/>
           </p:cNvPicPr>
@@ -4440,18 +5274,189 @@
         </p:blipFill>
         <p:spPr>
           <a:xfrm>
-            <a:off x="7970900" y="2336172"/>
-            <a:ext cx="4073935" cy="3055452"/>
+            <a:off x="3337932" y="2535401"/>
+            <a:ext cx="2714997" cy="1903769"/>
           </a:xfrm>
           <a:prstGeom prst="rect">
             <a:avLst/>
           </a:prstGeom>
         </p:spPr>
       </p:pic>
+      <p:pic>
+        <p:nvPicPr>
+          <p:cNvPr id="7" name="Picture 6"/>
+          <p:cNvPicPr>
+            <a:picLocks noChangeAspect="1"/>
+          </p:cNvPicPr>
+          <p:nvPr/>
+        </p:nvPicPr>
+        <p:blipFill>
+          <a:blip r:embed="rId5"/>
+          <a:stretch>
+            <a:fillRect/>
+          </a:stretch>
+        </p:blipFill>
+        <p:spPr>
+          <a:xfrm>
+            <a:off x="6168766" y="2535401"/>
+            <a:ext cx="2860656" cy="2005906"/>
+          </a:xfrm>
+          <a:prstGeom prst="rect">
+            <a:avLst/>
+          </a:prstGeom>
+        </p:spPr>
+      </p:pic>
+      <p:pic>
+        <p:nvPicPr>
+          <p:cNvPr id="8" name="Picture 7"/>
+          <p:cNvPicPr>
+            <a:picLocks noChangeAspect="1"/>
+          </p:cNvPicPr>
+          <p:nvPr/>
+        </p:nvPicPr>
+        <p:blipFill>
+          <a:blip r:embed="rId6"/>
+          <a:stretch>
+            <a:fillRect/>
+          </a:stretch>
+        </p:blipFill>
+        <p:spPr>
+          <a:xfrm>
+            <a:off x="460865" y="4541307"/>
+            <a:ext cx="2696353" cy="1890695"/>
+          </a:xfrm>
+          <a:prstGeom prst="rect">
+            <a:avLst/>
+          </a:prstGeom>
+        </p:spPr>
+      </p:pic>
+      <p:pic>
+        <p:nvPicPr>
+          <p:cNvPr id="9" name="Picture 8"/>
+          <p:cNvPicPr>
+            <a:picLocks noChangeAspect="1"/>
+          </p:cNvPicPr>
+          <p:nvPr/>
+        </p:nvPicPr>
+        <p:blipFill>
+          <a:blip r:embed="rId7"/>
+          <a:stretch>
+            <a:fillRect/>
+          </a:stretch>
+        </p:blipFill>
+        <p:spPr>
+          <a:xfrm>
+            <a:off x="3337932" y="4616994"/>
+            <a:ext cx="2714997" cy="1903770"/>
+          </a:xfrm>
+          <a:prstGeom prst="rect">
+            <a:avLst/>
+          </a:prstGeom>
+        </p:spPr>
+      </p:pic>
+      <p:pic>
+        <p:nvPicPr>
+          <p:cNvPr id="10" name="Picture 9"/>
+          <p:cNvPicPr>
+            <a:picLocks noChangeAspect="1"/>
+          </p:cNvPicPr>
+          <p:nvPr/>
+        </p:nvPicPr>
+        <p:blipFill>
+          <a:blip r:embed="rId8"/>
+          <a:stretch>
+            <a:fillRect/>
+          </a:stretch>
+        </p:blipFill>
+        <p:spPr>
+          <a:xfrm>
+            <a:off x="6299514" y="4609459"/>
+            <a:ext cx="2729908" cy="1914225"/>
+          </a:xfrm>
+          <a:prstGeom prst="rect">
+            <a:avLst/>
+          </a:prstGeom>
+        </p:spPr>
+      </p:pic>
+      <p:cxnSp>
+        <p:nvCxnSpPr>
+          <p:cNvPr id="12" name="Curved Connector 11"/>
+          <p:cNvCxnSpPr/>
+          <p:nvPr/>
+        </p:nvCxnSpPr>
+        <p:spPr>
+          <a:xfrm>
+            <a:off x="8487783" y="3759862"/>
+            <a:ext cx="1260000" cy="684000"/>
+          </a:xfrm>
+          <a:prstGeom prst="curvedConnector3">
+            <a:avLst>
+              <a:gd name="adj1" fmla="val 50000"/>
+            </a:avLst>
+          </a:prstGeom>
+          <a:ln>
+            <a:tailEnd type="triangle"/>
+          </a:ln>
+        </p:spPr>
+        <p:style>
+          <a:lnRef idx="1">
+            <a:schemeClr val="accent1"/>
+          </a:lnRef>
+          <a:fillRef idx="0">
+            <a:schemeClr val="accent1"/>
+          </a:fillRef>
+          <a:effectRef idx="0">
+            <a:schemeClr val="accent1"/>
+          </a:effectRef>
+          <a:fontRef idx="minor">
+            <a:schemeClr val="tx1"/>
+          </a:fontRef>
+        </p:style>
+      </p:cxnSp>
+      <p:sp>
+        <p:nvSpPr>
+          <p:cNvPr id="18" name="TextBox 17"/>
+          <p:cNvSpPr txBox="1"/>
+          <p:nvPr/>
+        </p:nvSpPr>
+        <p:spPr>
+          <a:xfrm>
+            <a:off x="9361718" y="4024394"/>
+            <a:ext cx="763399" cy="369332"/>
+          </a:xfrm>
+          <a:prstGeom prst="rect">
+            <a:avLst/>
+          </a:prstGeom>
+          <a:noFill/>
+        </p:spPr>
+        <p:txBody>
+          <a:bodyPr wrap="square" rtlCol="0">
+            <a:spAutoFit/>
+          </a:bodyPr>
+          <a:lstStyle/>
+          <a:p>
+            <a:r>
+              <a:rPr lang="en-CA" dirty="0">
+                <a:solidFill>
+                  <a:schemeClr val="accent1"/>
+                </a:solidFill>
+                <a:latin typeface="GreekC" panose="00000400000000000000" pitchFamily="2" charset="0"/>
+                <a:cs typeface="GreekC" panose="00000400000000000000" pitchFamily="2" charset="0"/>
+              </a:rPr>
+              <a:t>g</a:t>
+            </a:r>
+            <a:endParaRPr lang="en-CA" dirty="0">
+              <a:solidFill>
+                <a:schemeClr val="accent1"/>
+              </a:solidFill>
+            </a:endParaRPr>
+          </a:p>
+        </p:txBody>
+      </p:sp>
     </p:spTree>
     <p:extLst>
       <p:ext uri="{BB962C8B-B14F-4D97-AF65-F5344CB8AC3E}">
-        <p14:creationId xmlns:p14="http://schemas.microsoft.com/office/powerpoint/2010/main" val="3988722339"/>
+        <p14:creationId xmlns:p14="http://schemas.microsoft.com/office/powerpoint/2010/main" val="2716029540"/>
       </p:ext>
     </p:extLst>
   </p:cSld>
@@ -4483,7 +5488,7 @@
           <p:cNvPr id="2" name="Title 1">
             <a:extLst>
               <a:ext uri="{FF2B5EF4-FFF2-40B4-BE49-F238E27FC236}">
-                <a16:creationId xmlns:a16="http://schemas.microsoft.com/office/drawing/2014/main" id="{ECFEA841-EF7F-478D-A4EC-0BC53B51221A}"/>
+                <a16:creationId xmlns:a16="http://schemas.microsoft.com/office/drawing/2014/main" id="{551809E3-9188-4AAC-9E1B-88FFE3850BAC}"/>
               </a:ext>
             </a:extLst>
           </p:cNvPr>
@@ -4496,20 +5501,29 @@
         </p:nvSpPr>
         <p:spPr>
           <a:xfrm>
-            <a:off x="838200" y="365125"/>
-            <a:ext cx="10515600" cy="676275"/>
+            <a:off x="838200" y="365126"/>
+            <a:ext cx="10352714" cy="111372"/>
           </a:xfrm>
         </p:spPr>
         <p:txBody>
           <a:bodyPr>
-            <a:normAutofit fontScale="90000"/>
+            <a:noAutofit/>
           </a:bodyPr>
           <a:lstStyle/>
           <a:p>
             <a:r>
-              <a:rPr lang="en-CA" dirty="0"/>
-              <a:t>Model</a:t>
-            </a:r>
+              <a:rPr lang="en-CA" sz="2800" dirty="0"/>
+              <a:t>Results of solving </a:t>
+            </a:r>
+            <a:r>
+              <a:rPr lang="en-CA" sz="2800" dirty="0" err="1"/>
+              <a:t>Lindblad</a:t>
+            </a:r>
+            <a:r>
+              <a:rPr lang="en-CA" sz="2800" dirty="0"/>
+              <a:t> equation N=7 </a:t>
+            </a:r>
+            <a:endParaRPr lang="en-CA" sz="2800" dirty="0"/>
           </a:p>
         </p:txBody>
       </p:sp>
@@ -4518,7 +5532,7 @@
           <p:cNvPr id="3" name="Content Placeholder 2">
             <a:extLst>
               <a:ext uri="{FF2B5EF4-FFF2-40B4-BE49-F238E27FC236}">
-                <a16:creationId xmlns:a16="http://schemas.microsoft.com/office/drawing/2014/main" id="{AD74EEDD-E6DB-4093-8EE6-CB2B4C53BAD9}"/>
+                <a16:creationId xmlns:a16="http://schemas.microsoft.com/office/drawing/2014/main" id="{0CBD35D4-E87E-4006-A6A5-9062C6FAAEE4}"/>
               </a:ext>
             </a:extLst>
           </p:cNvPr>
@@ -4531,8 +5545,8 @@
         </p:nvSpPr>
         <p:spPr>
           <a:xfrm>
-            <a:off x="838200" y="1041400"/>
-            <a:ext cx="10515600" cy="5135563"/>
+            <a:off x="838200" y="1031846"/>
+            <a:ext cx="10515600" cy="5145117"/>
           </a:xfrm>
         </p:spPr>
         <p:txBody>
@@ -4542,113 +5556,74 @@
           <a:lstStyle/>
           <a:p>
             <a:r>
-              <a:rPr lang="en-US" sz="1100" b="0" i="0" dirty="0">
+              <a:rPr lang="en-CA" sz="1600" dirty="0" smtClean="0"/>
+              <a:t>Constant onsite energies W=1 </a:t>
+            </a:r>
+          </a:p>
+          <a:p>
+            <a:r>
+              <a:rPr lang="en-CA" sz="1600" dirty="0" smtClean="0"/>
+              <a:t> J=0.15 constant  unscaled</a:t>
+            </a:r>
+          </a:p>
+          <a:p>
+            <a:r>
+              <a:rPr lang="en-CA" sz="1600" dirty="0" smtClean="0"/>
+              <a:t>Loss from center</a:t>
+            </a:r>
+          </a:p>
+          <a:p>
+            <a:r>
+              <a:rPr lang="en-CA" sz="1600" dirty="0" smtClean="0"/>
+              <a:t>Random initial density</a:t>
+            </a:r>
+            <a:endParaRPr lang="en-CA" sz="1600" dirty="0"/>
+          </a:p>
+        </p:txBody>
+      </p:sp>
+      <p:sp>
+        <p:nvSpPr>
+          <p:cNvPr id="18" name="TextBox 17"/>
+          <p:cNvSpPr txBox="1"/>
+          <p:nvPr/>
+        </p:nvSpPr>
+        <p:spPr>
+          <a:xfrm>
+            <a:off x="10188363" y="3930217"/>
+            <a:ext cx="763399" cy="369332"/>
+          </a:xfrm>
+          <a:prstGeom prst="rect">
+            <a:avLst/>
+          </a:prstGeom>
+          <a:noFill/>
+        </p:spPr>
+        <p:txBody>
+          <a:bodyPr wrap="square" rtlCol="0">
+            <a:spAutoFit/>
+          </a:bodyPr>
+          <a:lstStyle/>
+          <a:p>
+            <a:r>
+              <a:rPr lang="en-CA" dirty="0">
                 <a:solidFill>
-                  <a:srgbClr val="333333"/>
+                  <a:schemeClr val="accent1"/>
                 </a:solidFill>
-                <a:effectLst/>
-                <a:latin typeface="-apple-system"/>
+                <a:latin typeface="GreekC" panose="00000400000000000000" pitchFamily="2" charset="0"/>
+                <a:cs typeface="GreekC" panose="00000400000000000000" pitchFamily="2" charset="0"/>
               </a:rPr>
-              <a:t> </a:t>
-            </a:r>
-            <a:r>
-              <a:rPr lang="en-US" sz="1100" b="0" i="1" dirty="0">
-                <a:solidFill>
-                  <a:srgbClr val="333333"/>
-                </a:solidFill>
-                <a:effectLst/>
-                <a:latin typeface="-apple-system"/>
-              </a:rPr>
-              <a:t>New J. Phys.</a:t>
-            </a:r>
-            <a:r>
-              <a:rPr lang="en-US" sz="1100" b="0" i="0" dirty="0">
-                <a:solidFill>
-                  <a:srgbClr val="333333"/>
-                </a:solidFill>
-                <a:effectLst/>
-                <a:latin typeface="-apple-system"/>
-              </a:rPr>
-              <a:t> </a:t>
-            </a:r>
-            <a:r>
-              <a:rPr lang="en-US" sz="1100" b="1" i="0" dirty="0">
-                <a:solidFill>
-                  <a:srgbClr val="333333"/>
-                </a:solidFill>
-                <a:effectLst/>
-                <a:latin typeface="-apple-system"/>
-              </a:rPr>
-              <a:t>21</a:t>
-            </a:r>
-            <a:r>
-              <a:rPr lang="en-US" sz="1100" b="0" i="0" dirty="0">
-                <a:solidFill>
-                  <a:srgbClr val="333333"/>
-                </a:solidFill>
-                <a:effectLst/>
-                <a:latin typeface="-apple-system"/>
-              </a:rPr>
-              <a:t> 043033</a:t>
-            </a:r>
-          </a:p>
-          <a:p>
-            <a:r>
-              <a:rPr lang="en-CA" sz="1100" b="0" i="0" dirty="0">
-                <a:effectLst/>
-                <a:latin typeface="Arial" panose="020B0604020202020204" pitchFamily="34" charset="0"/>
-              </a:rPr>
-              <a:t>Phys. Rev. Lett.120, 110601</a:t>
-            </a:r>
-          </a:p>
-          <a:p>
-            <a:endParaRPr lang="en-CA" sz="1100" dirty="0">
-              <a:latin typeface="Arial" panose="020B0604020202020204" pitchFamily="34" charset="0"/>
+              <a:t>g</a:t>
+            </a:r>
+            <a:endParaRPr lang="en-CA" dirty="0">
+              <a:solidFill>
+                <a:schemeClr val="accent1"/>
+              </a:solidFill>
             </a:endParaRPr>
-          </a:p>
-          <a:p>
-            <a:endParaRPr lang="en-CA" sz="1100" dirty="0">
-              <a:latin typeface="Arial" panose="020B0604020202020204" pitchFamily="34" charset="0"/>
-            </a:endParaRPr>
-          </a:p>
-          <a:p>
-            <a:r>
-              <a:rPr lang="en-CA" sz="1800" dirty="0"/>
-              <a:t>1D spin chain</a:t>
-            </a:r>
-          </a:p>
-          <a:p>
-            <a:endParaRPr lang="en-CA" sz="1800" dirty="0"/>
-          </a:p>
-          <a:p>
-            <a:endParaRPr lang="en-CA" sz="1800" dirty="0"/>
-          </a:p>
-          <a:p>
-            <a:endParaRPr lang="en-CA" sz="1800" dirty="0"/>
-          </a:p>
-          <a:p>
-            <a:endParaRPr lang="en-CA" sz="1800" dirty="0"/>
-          </a:p>
-          <a:p>
-            <a:endParaRPr lang="en-CA" sz="1800" dirty="0"/>
-          </a:p>
-          <a:p>
-            <a:r>
-              <a:rPr lang="en-CA" sz="1800" dirty="0"/>
-              <a:t>Lindblad dynamics</a:t>
-            </a:r>
           </a:p>
         </p:txBody>
       </p:sp>
       <p:pic>
         <p:nvPicPr>
-          <p:cNvPr id="5" name="Picture 4">
-            <a:extLst>
-              <a:ext uri="{FF2B5EF4-FFF2-40B4-BE49-F238E27FC236}">
-                <a16:creationId xmlns:a16="http://schemas.microsoft.com/office/drawing/2014/main" id="{2109D75D-E1A6-4FFE-AA0D-612E7858E274}"/>
-              </a:ext>
-            </a:extLst>
-          </p:cNvPr>
+          <p:cNvPr id="11" name="Picture 10"/>
           <p:cNvPicPr>
             <a:picLocks noChangeAspect="1"/>
           </p:cNvPicPr>
@@ -4662,8 +5637,8 @@
         </p:blipFill>
         <p:spPr>
           <a:xfrm>
-            <a:off x="3107175" y="1771179"/>
-            <a:ext cx="6357548" cy="1469344"/>
+            <a:off x="7125406" y="4487227"/>
+            <a:ext cx="2895296" cy="2030196"/>
           </a:xfrm>
           <a:prstGeom prst="rect">
             <a:avLst/>
@@ -4672,13 +5647,7 @@
       </p:pic>
       <p:pic>
         <p:nvPicPr>
-          <p:cNvPr id="7" name="Picture 6">
-            <a:extLst>
-              <a:ext uri="{FF2B5EF4-FFF2-40B4-BE49-F238E27FC236}">
-                <a16:creationId xmlns:a16="http://schemas.microsoft.com/office/drawing/2014/main" id="{3560F8E1-8B09-4C46-8196-693E6780025C}"/>
-              </a:ext>
-            </a:extLst>
-          </p:cNvPr>
+          <p:cNvPr id="19" name="Picture 18"/>
           <p:cNvPicPr>
             <a:picLocks noChangeAspect="1"/>
           </p:cNvPicPr>
@@ -4692,8 +5661,8 @@
         </p:blipFill>
         <p:spPr>
           <a:xfrm>
-            <a:off x="5095236" y="3346015"/>
-            <a:ext cx="3939584" cy="521319"/>
+            <a:off x="3981803" y="4454543"/>
+            <a:ext cx="2895296" cy="2030196"/>
           </a:xfrm>
           <a:prstGeom prst="rect">
             <a:avLst/>
@@ -4702,13 +5671,7 @@
       </p:pic>
       <p:pic>
         <p:nvPicPr>
-          <p:cNvPr id="13" name="Picture 12">
-            <a:extLst>
-              <a:ext uri="{FF2B5EF4-FFF2-40B4-BE49-F238E27FC236}">
-                <a16:creationId xmlns:a16="http://schemas.microsoft.com/office/drawing/2014/main" id="{92284C03-5A4C-47E3-B43F-4F192F845875}"/>
-              </a:ext>
-            </a:extLst>
-          </p:cNvPr>
+          <p:cNvPr id="20" name="Picture 19"/>
           <p:cNvPicPr>
             <a:picLocks noChangeAspect="1"/>
           </p:cNvPicPr>
@@ -4722,18 +5685,149 @@
         </p:blipFill>
         <p:spPr>
           <a:xfrm>
-            <a:off x="2936615" y="4083056"/>
-            <a:ext cx="6876125" cy="1223009"/>
+            <a:off x="838200" y="4454734"/>
+            <a:ext cx="2895296" cy="2030196"/>
           </a:xfrm>
           <a:prstGeom prst="rect">
             <a:avLst/>
           </a:prstGeom>
         </p:spPr>
       </p:pic>
+      <p:pic>
+        <p:nvPicPr>
+          <p:cNvPr id="21" name="Picture 20"/>
+          <p:cNvPicPr>
+            <a:picLocks noChangeAspect="1"/>
+          </p:cNvPicPr>
+          <p:nvPr/>
+        </p:nvPicPr>
+        <p:blipFill>
+          <a:blip r:embed="rId5"/>
+          <a:stretch>
+            <a:fillRect/>
+          </a:stretch>
+        </p:blipFill>
+        <p:spPr>
+          <a:xfrm>
+            <a:off x="7040734" y="2424347"/>
+            <a:ext cx="2895296" cy="2030196"/>
+          </a:xfrm>
+          <a:prstGeom prst="rect">
+            <a:avLst/>
+          </a:prstGeom>
+        </p:spPr>
+      </p:pic>
+      <p:pic>
+        <p:nvPicPr>
+          <p:cNvPr id="22" name="Picture 21"/>
+          <p:cNvPicPr>
+            <a:picLocks noChangeAspect="1"/>
+          </p:cNvPicPr>
+          <p:nvPr/>
+        </p:nvPicPr>
+        <p:blipFill>
+          <a:blip r:embed="rId6"/>
+          <a:stretch>
+            <a:fillRect/>
+          </a:stretch>
+        </p:blipFill>
+        <p:spPr>
+          <a:xfrm>
+            <a:off x="3970161" y="2457031"/>
+            <a:ext cx="2895296" cy="2030196"/>
+          </a:xfrm>
+          <a:prstGeom prst="rect">
+            <a:avLst/>
+          </a:prstGeom>
+        </p:spPr>
+      </p:pic>
+      <p:pic>
+        <p:nvPicPr>
+          <p:cNvPr id="23" name="Picture 22"/>
+          <p:cNvPicPr>
+            <a:picLocks noChangeAspect="1"/>
+          </p:cNvPicPr>
+          <p:nvPr/>
+        </p:nvPicPr>
+        <p:blipFill>
+          <a:blip r:embed="rId7"/>
+          <a:stretch>
+            <a:fillRect/>
+          </a:stretch>
+        </p:blipFill>
+        <p:spPr>
+          <a:xfrm>
+            <a:off x="814143" y="2457031"/>
+            <a:ext cx="2895296" cy="2030196"/>
+          </a:xfrm>
+          <a:prstGeom prst="rect">
+            <a:avLst/>
+          </a:prstGeom>
+        </p:spPr>
+      </p:pic>
+      <p:pic>
+        <p:nvPicPr>
+          <p:cNvPr id="24" name="Picture 23"/>
+          <p:cNvPicPr>
+            <a:picLocks noChangeAspect="1"/>
+          </p:cNvPicPr>
+          <p:nvPr/>
+        </p:nvPicPr>
+        <p:blipFill>
+          <a:blip r:embed="rId8"/>
+          <a:stretch>
+            <a:fillRect/>
+          </a:stretch>
+        </p:blipFill>
+        <p:spPr>
+          <a:xfrm>
+            <a:off x="7016677" y="420812"/>
+            <a:ext cx="2895296" cy="2030196"/>
+          </a:xfrm>
+          <a:prstGeom prst="rect">
+            <a:avLst/>
+          </a:prstGeom>
+        </p:spPr>
+      </p:pic>
+      <p:cxnSp>
+        <p:nvCxnSpPr>
+          <p:cNvPr id="12" name="Curved Connector 11"/>
+          <p:cNvCxnSpPr/>
+          <p:nvPr/>
+        </p:nvCxnSpPr>
+        <p:spPr>
+          <a:xfrm>
+            <a:off x="9330087" y="3629985"/>
+            <a:ext cx="1260000" cy="684000"/>
+          </a:xfrm>
+          <a:prstGeom prst="curvedConnector3">
+            <a:avLst>
+              <a:gd name="adj1" fmla="val 50000"/>
+            </a:avLst>
+          </a:prstGeom>
+          <a:ln>
+            <a:tailEnd type="triangle"/>
+          </a:ln>
+        </p:spPr>
+        <p:style>
+          <a:lnRef idx="1">
+            <a:schemeClr val="accent1"/>
+          </a:lnRef>
+          <a:fillRef idx="0">
+            <a:schemeClr val="accent1"/>
+          </a:fillRef>
+          <a:effectRef idx="0">
+            <a:schemeClr val="accent1"/>
+          </a:effectRef>
+          <a:fontRef idx="minor">
+            <a:schemeClr val="tx1"/>
+          </a:fontRef>
+        </p:style>
+      </p:cxnSp>
     </p:spTree>
     <p:extLst>
       <p:ext uri="{BB962C8B-B14F-4D97-AF65-F5344CB8AC3E}">
-        <p14:creationId xmlns:p14="http://schemas.microsoft.com/office/powerpoint/2010/main" val="976939348"/>
+        <p14:creationId xmlns:p14="http://schemas.microsoft.com/office/powerpoint/2010/main" val="3128758576"/>
       </p:ext>
     </p:extLst>
   </p:cSld>
@@ -4765,7 +5859,7 @@
           <p:cNvPr id="2" name="Title 1">
             <a:extLst>
               <a:ext uri="{FF2B5EF4-FFF2-40B4-BE49-F238E27FC236}">
-                <a16:creationId xmlns:a16="http://schemas.microsoft.com/office/drawing/2014/main" id="{B7CD6567-98F0-4B6D-B7C4-AC8A2DA4F413}"/>
+                <a16:creationId xmlns:a16="http://schemas.microsoft.com/office/drawing/2014/main" id="{551809E3-9188-4AAC-9E1B-88FFE3850BAC}"/>
               </a:ext>
             </a:extLst>
           </p:cNvPr>
@@ -4778,20 +5872,29 @@
         </p:nvSpPr>
         <p:spPr>
           <a:xfrm>
-            <a:off x="838200" y="365125"/>
-            <a:ext cx="10515600" cy="549275"/>
+            <a:off x="838200" y="365126"/>
+            <a:ext cx="10352714" cy="111372"/>
           </a:xfrm>
         </p:spPr>
         <p:txBody>
           <a:bodyPr>
-            <a:normAutofit fontScale="90000"/>
+            <a:noAutofit/>
           </a:bodyPr>
           <a:lstStyle/>
           <a:p>
             <a:r>
-              <a:rPr lang="en-CA" dirty="0"/>
-              <a:t>Results of solving Lindblad equation N=7 </a:t>
-            </a:r>
+              <a:rPr lang="en-CA" sz="2800" dirty="0"/>
+              <a:t>Results of solving </a:t>
+            </a:r>
+            <a:r>
+              <a:rPr lang="en-CA" sz="2800" dirty="0" err="1"/>
+              <a:t>Lindblad</a:t>
+            </a:r>
+            <a:r>
+              <a:rPr lang="en-CA" sz="2800" dirty="0"/>
+              <a:t> equation N=7 </a:t>
+            </a:r>
+            <a:endParaRPr lang="en-CA" sz="2800" dirty="0"/>
           </a:p>
         </p:txBody>
       </p:sp>
@@ -4800,7 +5903,7 @@
           <p:cNvPr id="3" name="Content Placeholder 2">
             <a:extLst>
               <a:ext uri="{FF2B5EF4-FFF2-40B4-BE49-F238E27FC236}">
-                <a16:creationId xmlns:a16="http://schemas.microsoft.com/office/drawing/2014/main" id="{6BECF0C4-55C5-478A-A507-573D6666F066}"/>
+                <a16:creationId xmlns:a16="http://schemas.microsoft.com/office/drawing/2014/main" id="{0CBD35D4-E87E-4006-A6A5-9062C6FAAEE4}"/>
               </a:ext>
             </a:extLst>
           </p:cNvPr>
@@ -4813,22 +5916,289 @@
         </p:nvSpPr>
         <p:spPr>
           <a:xfrm>
-            <a:off x="838200" y="1180531"/>
-            <a:ext cx="10515600" cy="4996432"/>
-          </a:xfrm>
-        </p:spPr>
-        <p:txBody>
-          <a:bodyPr/>
-          <a:lstStyle/>
-          <a:p>
-            <a:endParaRPr lang="en-CA" dirty="0"/>
-          </a:p>
-        </p:txBody>
-      </p:sp>
+            <a:off x="838200" y="1031846"/>
+            <a:ext cx="10515600" cy="5145117"/>
+          </a:xfrm>
+        </p:spPr>
+        <p:txBody>
+          <a:bodyPr>
+            <a:normAutofit/>
+          </a:bodyPr>
+          <a:lstStyle/>
+          <a:p>
+            <a:r>
+              <a:rPr lang="en-CA" sz="1600" dirty="0" smtClean="0"/>
+              <a:t>Constant onsite energies W=1 </a:t>
+            </a:r>
+          </a:p>
+          <a:p>
+            <a:r>
+              <a:rPr lang="en-CA" sz="1600" dirty="0"/>
+              <a:t>J=0.15 is scaled with distance by r^-3</a:t>
+            </a:r>
+          </a:p>
+          <a:p>
+            <a:r>
+              <a:rPr lang="en-CA" sz="1600" dirty="0" smtClean="0"/>
+              <a:t>Loss from one end</a:t>
+            </a:r>
+          </a:p>
+          <a:p>
+            <a:r>
+              <a:rPr lang="en-CA" sz="1600" dirty="0" smtClean="0"/>
+              <a:t>Random initial density</a:t>
+            </a:r>
+            <a:endParaRPr lang="en-CA" sz="1600" dirty="0"/>
+          </a:p>
+        </p:txBody>
+      </p:sp>
+      <p:sp>
+        <p:nvSpPr>
+          <p:cNvPr id="18" name="TextBox 17"/>
+          <p:cNvSpPr txBox="1"/>
+          <p:nvPr/>
+        </p:nvSpPr>
+        <p:spPr>
+          <a:xfrm>
+            <a:off x="10299120" y="2040912"/>
+            <a:ext cx="763399" cy="369332"/>
+          </a:xfrm>
+          <a:prstGeom prst="rect">
+            <a:avLst/>
+          </a:prstGeom>
+          <a:noFill/>
+        </p:spPr>
+        <p:txBody>
+          <a:bodyPr wrap="square" rtlCol="0">
+            <a:spAutoFit/>
+          </a:bodyPr>
+          <a:lstStyle/>
+          <a:p>
+            <a:r>
+              <a:rPr lang="en-CA" dirty="0">
+                <a:solidFill>
+                  <a:schemeClr val="accent1"/>
+                </a:solidFill>
+                <a:latin typeface="GreekC" panose="00000400000000000000" pitchFamily="2" charset="0"/>
+                <a:cs typeface="GreekC" panose="00000400000000000000" pitchFamily="2" charset="0"/>
+              </a:rPr>
+              <a:t>g</a:t>
+            </a:r>
+            <a:endParaRPr lang="en-CA" dirty="0">
+              <a:solidFill>
+                <a:schemeClr val="accent1"/>
+              </a:solidFill>
+            </a:endParaRPr>
+          </a:p>
+        </p:txBody>
+      </p:sp>
+      <p:pic>
+        <p:nvPicPr>
+          <p:cNvPr id="4" name="Picture 3"/>
+          <p:cNvPicPr>
+            <a:picLocks noChangeAspect="1"/>
+          </p:cNvPicPr>
+          <p:nvPr/>
+        </p:nvPicPr>
+        <p:blipFill>
+          <a:blip r:embed="rId2"/>
+          <a:stretch>
+            <a:fillRect/>
+          </a:stretch>
+        </p:blipFill>
+        <p:spPr>
+          <a:xfrm>
+            <a:off x="7404728" y="608783"/>
+            <a:ext cx="2877978" cy="2003570"/>
+          </a:xfrm>
+          <a:prstGeom prst="rect">
+            <a:avLst/>
+          </a:prstGeom>
+        </p:spPr>
+      </p:pic>
+      <p:pic>
+        <p:nvPicPr>
+          <p:cNvPr id="5" name="Picture 4"/>
+          <p:cNvPicPr>
+            <a:picLocks noChangeAspect="1"/>
+          </p:cNvPicPr>
+          <p:nvPr/>
+        </p:nvPicPr>
+        <p:blipFill>
+          <a:blip r:embed="rId3"/>
+          <a:stretch>
+            <a:fillRect/>
+          </a:stretch>
+        </p:blipFill>
+        <p:spPr>
+          <a:xfrm>
+            <a:off x="838200" y="2732015"/>
+            <a:ext cx="2877978" cy="2003570"/>
+          </a:xfrm>
+          <a:prstGeom prst="rect">
+            <a:avLst/>
+          </a:prstGeom>
+        </p:spPr>
+      </p:pic>
+      <p:pic>
+        <p:nvPicPr>
+          <p:cNvPr id="6" name="Picture 5"/>
+          <p:cNvPicPr>
+            <a:picLocks noChangeAspect="1"/>
+          </p:cNvPicPr>
+          <p:nvPr/>
+        </p:nvPicPr>
+        <p:blipFill>
+          <a:blip r:embed="rId4"/>
+          <a:stretch>
+            <a:fillRect/>
+          </a:stretch>
+        </p:blipFill>
+        <p:spPr>
+          <a:xfrm>
+            <a:off x="4142051" y="2732015"/>
+            <a:ext cx="2877978" cy="2003570"/>
+          </a:xfrm>
+          <a:prstGeom prst="rect">
+            <a:avLst/>
+          </a:prstGeom>
+        </p:spPr>
+      </p:pic>
+      <p:pic>
+        <p:nvPicPr>
+          <p:cNvPr id="7" name="Picture 6"/>
+          <p:cNvPicPr>
+            <a:picLocks noChangeAspect="1"/>
+          </p:cNvPicPr>
+          <p:nvPr/>
+        </p:nvPicPr>
+        <p:blipFill>
+          <a:blip r:embed="rId5"/>
+          <a:stretch>
+            <a:fillRect/>
+          </a:stretch>
+        </p:blipFill>
+        <p:spPr>
+          <a:xfrm>
+            <a:off x="7404728" y="2725171"/>
+            <a:ext cx="2877978" cy="2003570"/>
+          </a:xfrm>
+          <a:prstGeom prst="rect">
+            <a:avLst/>
+          </a:prstGeom>
+        </p:spPr>
+      </p:pic>
+      <p:pic>
+        <p:nvPicPr>
+          <p:cNvPr id="8" name="Picture 7"/>
+          <p:cNvPicPr>
+            <a:picLocks noChangeAspect="1"/>
+          </p:cNvPicPr>
+          <p:nvPr/>
+        </p:nvPicPr>
+        <p:blipFill>
+          <a:blip r:embed="rId6"/>
+          <a:stretch>
+            <a:fillRect/>
+          </a:stretch>
+        </p:blipFill>
+        <p:spPr>
+          <a:xfrm>
+            <a:off x="4142051" y="4735585"/>
+            <a:ext cx="2877978" cy="2003570"/>
+          </a:xfrm>
+          <a:prstGeom prst="rect">
+            <a:avLst/>
+          </a:prstGeom>
+        </p:spPr>
+      </p:pic>
+      <p:pic>
+        <p:nvPicPr>
+          <p:cNvPr id="9" name="Picture 8"/>
+          <p:cNvPicPr>
+            <a:picLocks noChangeAspect="1"/>
+          </p:cNvPicPr>
+          <p:nvPr/>
+        </p:nvPicPr>
+        <p:blipFill>
+          <a:blip r:embed="rId7"/>
+          <a:stretch>
+            <a:fillRect/>
+          </a:stretch>
+        </p:blipFill>
+        <p:spPr>
+          <a:xfrm>
+            <a:off x="838200" y="4854430"/>
+            <a:ext cx="2877978" cy="2003570"/>
+          </a:xfrm>
+          <a:prstGeom prst="rect">
+            <a:avLst/>
+          </a:prstGeom>
+        </p:spPr>
+      </p:pic>
+      <p:pic>
+        <p:nvPicPr>
+          <p:cNvPr id="10" name="Picture 9"/>
+          <p:cNvPicPr>
+            <a:picLocks noChangeAspect="1"/>
+          </p:cNvPicPr>
+          <p:nvPr/>
+        </p:nvPicPr>
+        <p:blipFill>
+          <a:blip r:embed="rId8"/>
+          <a:stretch>
+            <a:fillRect/>
+          </a:stretch>
+        </p:blipFill>
+        <p:spPr>
+          <a:xfrm>
+            <a:off x="7399520" y="4744588"/>
+            <a:ext cx="2877978" cy="2003570"/>
+          </a:xfrm>
+          <a:prstGeom prst="rect">
+            <a:avLst/>
+          </a:prstGeom>
+        </p:spPr>
+      </p:pic>
+      <p:cxnSp>
+        <p:nvCxnSpPr>
+          <p:cNvPr id="12" name="Curved Connector 11"/>
+          <p:cNvCxnSpPr/>
+          <p:nvPr/>
+        </p:nvCxnSpPr>
+        <p:spPr>
+          <a:xfrm>
+            <a:off x="9558253" y="1780648"/>
+            <a:ext cx="1260000" cy="684000"/>
+          </a:xfrm>
+          <a:prstGeom prst="curvedConnector3">
+            <a:avLst>
+              <a:gd name="adj1" fmla="val 50000"/>
+            </a:avLst>
+          </a:prstGeom>
+          <a:ln>
+            <a:tailEnd type="triangle"/>
+          </a:ln>
+        </p:spPr>
+        <p:style>
+          <a:lnRef idx="1">
+            <a:schemeClr val="accent1"/>
+          </a:lnRef>
+          <a:fillRef idx="0">
+            <a:schemeClr val="accent1"/>
+          </a:fillRef>
+          <a:effectRef idx="0">
+            <a:schemeClr val="accent1"/>
+          </a:effectRef>
+          <a:fontRef idx="minor">
+            <a:schemeClr val="tx1"/>
+          </a:fontRef>
+        </p:style>
+      </p:cxnSp>
     </p:spTree>
     <p:extLst>
       <p:ext uri="{BB962C8B-B14F-4D97-AF65-F5344CB8AC3E}">
-        <p14:creationId xmlns:p14="http://schemas.microsoft.com/office/powerpoint/2010/main" val="74242583"/>
+        <p14:creationId xmlns:p14="http://schemas.microsoft.com/office/powerpoint/2010/main" val="3635708822"/>
       </p:ext>
     </p:extLst>
   </p:cSld>
@@ -4871,12 +6241,31 @@
             <p:ph type="title"/>
           </p:nvPr>
         </p:nvSpPr>
-        <p:spPr/>
-        <p:txBody>
-          <a:bodyPr/>
-          <a:lstStyle/>
-          <a:p>
-            <a:endParaRPr lang="en-CA"/>
+        <p:spPr>
+          <a:xfrm>
+            <a:off x="838200" y="365126"/>
+            <a:ext cx="10352714" cy="111372"/>
+          </a:xfrm>
+        </p:spPr>
+        <p:txBody>
+          <a:bodyPr>
+            <a:noAutofit/>
+          </a:bodyPr>
+          <a:lstStyle/>
+          <a:p>
+            <a:r>
+              <a:rPr lang="en-CA" sz="2800" dirty="0"/>
+              <a:t>Results of solving </a:t>
+            </a:r>
+            <a:r>
+              <a:rPr lang="en-CA" sz="2800" dirty="0" err="1"/>
+              <a:t>Lindblad</a:t>
+            </a:r>
+            <a:r>
+              <a:rPr lang="en-CA" sz="2800" dirty="0"/>
+              <a:t> equation N=7 </a:t>
+            </a:r>
+            <a:endParaRPr lang="en-CA" sz="2800" dirty="0"/>
           </a:p>
         </p:txBody>
       </p:sp>
@@ -4896,19 +6285,291 @@
             <p:ph idx="1"/>
           </p:nvPr>
         </p:nvSpPr>
-        <p:spPr/>
-        <p:txBody>
-          <a:bodyPr/>
-          <a:lstStyle/>
-          <a:p>
-            <a:endParaRPr lang="en-CA"/>
+        <p:spPr>
+          <a:xfrm>
+            <a:off x="838200" y="1031846"/>
+            <a:ext cx="10515600" cy="5145117"/>
+          </a:xfrm>
+        </p:spPr>
+        <p:txBody>
+          <a:bodyPr>
+            <a:normAutofit/>
+          </a:bodyPr>
+          <a:lstStyle/>
+          <a:p>
+            <a:r>
+              <a:rPr lang="en-CA" sz="1600" dirty="0" smtClean="0"/>
+              <a:t>Random energies W=1 </a:t>
+            </a:r>
+          </a:p>
+          <a:p>
+            <a:r>
+              <a:rPr lang="en-CA" sz="1600" dirty="0" smtClean="0"/>
+              <a:t>Random J &lt; 0.15 </a:t>
+            </a:r>
+          </a:p>
+          <a:p>
+            <a:r>
+              <a:rPr lang="en-CA" sz="1600" dirty="0" smtClean="0"/>
+              <a:t>Loss from center</a:t>
+            </a:r>
+          </a:p>
+          <a:p>
+            <a:r>
+              <a:rPr lang="en-CA" sz="1600" dirty="0" smtClean="0"/>
+              <a:t>Random initial density</a:t>
+            </a:r>
+            <a:endParaRPr lang="en-CA" sz="1600" dirty="0"/>
+          </a:p>
+        </p:txBody>
+      </p:sp>
+      <p:pic>
+        <p:nvPicPr>
+          <p:cNvPr id="11" name="Picture 10"/>
+          <p:cNvPicPr>
+            <a:picLocks noChangeAspect="1"/>
+          </p:cNvPicPr>
+          <p:nvPr/>
+        </p:nvPicPr>
+        <p:blipFill>
+          <a:blip r:embed="rId2"/>
+          <a:stretch>
+            <a:fillRect/>
+          </a:stretch>
+        </p:blipFill>
+        <p:spPr>
+          <a:xfrm>
+            <a:off x="7302200" y="407680"/>
+            <a:ext cx="3045236" cy="2104902"/>
+          </a:xfrm>
+          <a:prstGeom prst="rect">
+            <a:avLst/>
+          </a:prstGeom>
+        </p:spPr>
+      </p:pic>
+      <p:pic>
+        <p:nvPicPr>
+          <p:cNvPr id="13" name="Picture 12"/>
+          <p:cNvPicPr>
+            <a:picLocks noChangeAspect="1"/>
+          </p:cNvPicPr>
+          <p:nvPr/>
+        </p:nvPicPr>
+        <p:blipFill>
+          <a:blip r:embed="rId3"/>
+          <a:stretch>
+            <a:fillRect/>
+          </a:stretch>
+        </p:blipFill>
+        <p:spPr>
+          <a:xfrm>
+            <a:off x="958283" y="2380180"/>
+            <a:ext cx="3045236" cy="2104902"/>
+          </a:xfrm>
+          <a:prstGeom prst="rect">
+            <a:avLst/>
+          </a:prstGeom>
+        </p:spPr>
+      </p:pic>
+      <p:pic>
+        <p:nvPicPr>
+          <p:cNvPr id="14" name="Picture 13"/>
+          <p:cNvPicPr>
+            <a:picLocks noChangeAspect="1"/>
+          </p:cNvPicPr>
+          <p:nvPr/>
+        </p:nvPicPr>
+        <p:blipFill>
+          <a:blip r:embed="rId4"/>
+          <a:stretch>
+            <a:fillRect/>
+          </a:stretch>
+        </p:blipFill>
+        <p:spPr>
+          <a:xfrm>
+            <a:off x="4194878" y="2424443"/>
+            <a:ext cx="3045236" cy="2104902"/>
+          </a:xfrm>
+          <a:prstGeom prst="rect">
+            <a:avLst/>
+          </a:prstGeom>
+        </p:spPr>
+      </p:pic>
+      <p:pic>
+        <p:nvPicPr>
+          <p:cNvPr id="15" name="Picture 14"/>
+          <p:cNvPicPr>
+            <a:picLocks noChangeAspect="1"/>
+          </p:cNvPicPr>
+          <p:nvPr/>
+        </p:nvPicPr>
+        <p:blipFill>
+          <a:blip r:embed="rId5"/>
+          <a:stretch>
+            <a:fillRect/>
+          </a:stretch>
+        </p:blipFill>
+        <p:spPr>
+          <a:xfrm>
+            <a:off x="7302200" y="2433669"/>
+            <a:ext cx="3045236" cy="2104902"/>
+          </a:xfrm>
+          <a:prstGeom prst="rect">
+            <a:avLst/>
+          </a:prstGeom>
+        </p:spPr>
+      </p:pic>
+      <p:pic>
+        <p:nvPicPr>
+          <p:cNvPr id="16" name="Picture 15"/>
+          <p:cNvPicPr>
+            <a:picLocks noChangeAspect="1"/>
+          </p:cNvPicPr>
+          <p:nvPr/>
+        </p:nvPicPr>
+        <p:blipFill>
+          <a:blip r:embed="rId6"/>
+          <a:stretch>
+            <a:fillRect/>
+          </a:stretch>
+        </p:blipFill>
+        <p:spPr>
+          <a:xfrm>
+            <a:off x="979983" y="4398923"/>
+            <a:ext cx="3023536" cy="2104902"/>
+          </a:xfrm>
+          <a:prstGeom prst="rect">
+            <a:avLst/>
+          </a:prstGeom>
+        </p:spPr>
+      </p:pic>
+      <p:pic>
+        <p:nvPicPr>
+          <p:cNvPr id="17" name="Picture 16"/>
+          <p:cNvPicPr>
+            <a:picLocks noChangeAspect="1"/>
+          </p:cNvPicPr>
+          <p:nvPr/>
+        </p:nvPicPr>
+        <p:blipFill>
+          <a:blip r:embed="rId7"/>
+          <a:stretch>
+            <a:fillRect/>
+          </a:stretch>
+        </p:blipFill>
+        <p:spPr>
+          <a:xfrm>
+            <a:off x="4205728" y="4485082"/>
+            <a:ext cx="3023536" cy="2104902"/>
+          </a:xfrm>
+          <a:prstGeom prst="rect">
+            <a:avLst/>
+          </a:prstGeom>
+        </p:spPr>
+      </p:pic>
+      <p:pic>
+        <p:nvPicPr>
+          <p:cNvPr id="19" name="Picture 18"/>
+          <p:cNvPicPr>
+            <a:picLocks noChangeAspect="1"/>
+          </p:cNvPicPr>
+          <p:nvPr/>
+        </p:nvPicPr>
+        <p:blipFill>
+          <a:blip r:embed="rId8"/>
+          <a:stretch>
+            <a:fillRect/>
+          </a:stretch>
+        </p:blipFill>
+        <p:spPr>
+          <a:xfrm>
+            <a:off x="7322092" y="4500732"/>
+            <a:ext cx="3023536" cy="2104902"/>
+          </a:xfrm>
+          <a:prstGeom prst="rect">
+            <a:avLst/>
+          </a:prstGeom>
+        </p:spPr>
+      </p:pic>
+      <p:cxnSp>
+        <p:nvCxnSpPr>
+          <p:cNvPr id="12" name="Curved Connector 11"/>
+          <p:cNvCxnSpPr/>
+          <p:nvPr/>
+        </p:nvCxnSpPr>
+        <p:spPr>
+          <a:xfrm>
+            <a:off x="9642879" y="3581754"/>
+            <a:ext cx="1260000" cy="684000"/>
+          </a:xfrm>
+          <a:prstGeom prst="curvedConnector3">
+            <a:avLst>
+              <a:gd name="adj1" fmla="val 50000"/>
+            </a:avLst>
+          </a:prstGeom>
+          <a:ln>
+            <a:tailEnd type="triangle"/>
+          </a:ln>
+        </p:spPr>
+        <p:style>
+          <a:lnRef idx="1">
+            <a:schemeClr val="accent1"/>
+          </a:lnRef>
+          <a:fillRef idx="0">
+            <a:schemeClr val="accent1"/>
+          </a:fillRef>
+          <a:effectRef idx="0">
+            <a:schemeClr val="accent1"/>
+          </a:effectRef>
+          <a:fontRef idx="minor">
+            <a:schemeClr val="tx1"/>
+          </a:fontRef>
+        </p:style>
+      </p:cxnSp>
+      <p:sp>
+        <p:nvSpPr>
+          <p:cNvPr id="18" name="TextBox 17"/>
+          <p:cNvSpPr txBox="1"/>
+          <p:nvPr/>
+        </p:nvSpPr>
+        <p:spPr>
+          <a:xfrm>
+            <a:off x="10236686" y="3702729"/>
+            <a:ext cx="763399" cy="369332"/>
+          </a:xfrm>
+          <a:prstGeom prst="rect">
+            <a:avLst/>
+          </a:prstGeom>
+          <a:noFill/>
+        </p:spPr>
+        <p:txBody>
+          <a:bodyPr wrap="square" rtlCol="0">
+            <a:spAutoFit/>
+          </a:bodyPr>
+          <a:lstStyle/>
+          <a:p>
+            <a:r>
+              <a:rPr lang="en-CA" dirty="0" smtClean="0">
+                <a:solidFill>
+                  <a:schemeClr val="accent1"/>
+                </a:solidFill>
+                <a:latin typeface="GreekC" panose="00000400000000000000" pitchFamily="2" charset="0"/>
+                <a:cs typeface="GreekC" panose="00000400000000000000" pitchFamily="2" charset="0"/>
+              </a:rPr>
+              <a:t>g</a:t>
+            </a:r>
+            <a:endParaRPr lang="en-CA" dirty="0">
+              <a:solidFill>
+                <a:schemeClr val="accent1"/>
+              </a:solidFill>
+            </a:endParaRPr>
           </a:p>
         </p:txBody>
       </p:sp>
     </p:spTree>
     <p:extLst>
       <p:ext uri="{BB962C8B-B14F-4D97-AF65-F5344CB8AC3E}">
-        <p14:creationId xmlns:p14="http://schemas.microsoft.com/office/powerpoint/2010/main" val="2716029540"/>
+        <p14:creationId xmlns:p14="http://schemas.microsoft.com/office/powerpoint/2010/main" val="1161319049"/>
       </p:ext>
     </p:extLst>
   </p:cSld>

</xml_diff>